<commit_message>
doc: motor control for quad and tri copter
</commit_message>
<xml_diff>
--- a/doc/source/figs.pptx
+++ b/doc/source/figs.pptx
@@ -68,8 +68,8 @@
         </p:nvSpPr>
         <p:spPr>
           <a:xfrm>
-            <a:off x="685800" y="2130480"/>
-            <a:ext cx="7771680" cy="1469160"/>
+            <a:off x="457200" y="273600"/>
+            <a:ext cx="8229240" cy="1144800"/>
           </a:xfrm>
           <a:prstGeom prst="rect">
             <a:avLst/>
@@ -106,7 +106,7 @@
         <p:spPr>
           <a:xfrm>
             <a:off x="457200" y="1604520"/>
-            <a:ext cx="8228880" cy="1896840"/>
+            <a:ext cx="8229240" cy="1896840"/>
           </a:xfrm>
           <a:prstGeom prst="rect">
             <a:avLst/>
@@ -144,7 +144,7 @@
         <p:spPr>
           <a:xfrm>
             <a:off x="457200" y="3682080"/>
-            <a:ext cx="8228880" cy="1896840"/>
+            <a:ext cx="8229240" cy="1896840"/>
           </a:xfrm>
           <a:prstGeom prst="rect">
             <a:avLst/>
@@ -203,8 +203,8 @@
         </p:nvSpPr>
         <p:spPr>
           <a:xfrm>
-            <a:off x="685800" y="2130480"/>
-            <a:ext cx="7771680" cy="1469160"/>
+            <a:off x="457200" y="273600"/>
+            <a:ext cx="8229240" cy="1144800"/>
           </a:xfrm>
           <a:prstGeom prst="rect">
             <a:avLst/>
@@ -241,7 +241,7 @@
         <p:spPr>
           <a:xfrm>
             <a:off x="457200" y="1604520"/>
-            <a:ext cx="4015440" cy="1896840"/>
+            <a:ext cx="4015800" cy="1896840"/>
           </a:xfrm>
           <a:prstGeom prst="rect">
             <a:avLst/>
@@ -278,8 +278,8 @@
         </p:nvSpPr>
         <p:spPr>
           <a:xfrm>
-            <a:off x="4673880" y="1604520"/>
-            <a:ext cx="4015440" cy="1896840"/>
+            <a:off x="4674240" y="1604520"/>
+            <a:ext cx="4015800" cy="1896840"/>
           </a:xfrm>
           <a:prstGeom prst="rect">
             <a:avLst/>
@@ -316,8 +316,8 @@
         </p:nvSpPr>
         <p:spPr>
           <a:xfrm>
-            <a:off x="4673880" y="3682080"/>
-            <a:ext cx="4015440" cy="1896840"/>
+            <a:off x="4674240" y="3682080"/>
+            <a:ext cx="4015800" cy="1896840"/>
           </a:xfrm>
           <a:prstGeom prst="rect">
             <a:avLst/>
@@ -355,7 +355,7 @@
         <p:spPr>
           <a:xfrm>
             <a:off x="457200" y="3682080"/>
-            <a:ext cx="4015440" cy="1896840"/>
+            <a:ext cx="4015800" cy="1896840"/>
           </a:xfrm>
           <a:prstGeom prst="rect">
             <a:avLst/>
@@ -414,8 +414,8 @@
         </p:nvSpPr>
         <p:spPr>
           <a:xfrm>
-            <a:off x="685800" y="2130480"/>
-            <a:ext cx="7771680" cy="1469160"/>
+            <a:off x="457200" y="273600"/>
+            <a:ext cx="8229240" cy="1144800"/>
           </a:xfrm>
           <a:prstGeom prst="rect">
             <a:avLst/>
@@ -723,8 +723,8 @@
         </p:nvSpPr>
         <p:spPr>
           <a:xfrm>
-            <a:off x="685800" y="2130480"/>
-            <a:ext cx="7771680" cy="1469160"/>
+            <a:off x="457200" y="273600"/>
+            <a:ext cx="8229240" cy="1144800"/>
           </a:xfrm>
           <a:prstGeom prst="rect">
             <a:avLst/>
@@ -761,7 +761,7 @@
         <p:spPr>
           <a:xfrm>
             <a:off x="457200" y="1604520"/>
-            <a:ext cx="8228880" cy="3976920"/>
+            <a:ext cx="8229240" cy="3977280"/>
           </a:xfrm>
           <a:prstGeom prst="rect">
             <a:avLst/>
@@ -819,8 +819,8 @@
         </p:nvSpPr>
         <p:spPr>
           <a:xfrm>
-            <a:off x="685800" y="2130480"/>
-            <a:ext cx="7771680" cy="1469160"/>
+            <a:off x="457200" y="273600"/>
+            <a:ext cx="8229240" cy="1144800"/>
           </a:xfrm>
           <a:prstGeom prst="rect">
             <a:avLst/>
@@ -857,7 +857,7 @@
         <p:spPr>
           <a:xfrm>
             <a:off x="457200" y="1604520"/>
-            <a:ext cx="8228880" cy="3976920"/>
+            <a:ext cx="8229240" cy="3977280"/>
           </a:xfrm>
           <a:prstGeom prst="rect">
             <a:avLst/>
@@ -916,8 +916,8 @@
         </p:nvSpPr>
         <p:spPr>
           <a:xfrm>
-            <a:off x="685800" y="2130480"/>
-            <a:ext cx="7771680" cy="1469160"/>
+            <a:off x="457200" y="273600"/>
+            <a:ext cx="8229240" cy="1144800"/>
           </a:xfrm>
           <a:prstGeom prst="rect">
             <a:avLst/>
@@ -954,7 +954,7 @@
         <p:spPr>
           <a:xfrm>
             <a:off x="457200" y="1604520"/>
-            <a:ext cx="4015440" cy="3976920"/>
+            <a:ext cx="4015800" cy="3977280"/>
           </a:xfrm>
           <a:prstGeom prst="rect">
             <a:avLst/>
@@ -991,8 +991,8 @@
         </p:nvSpPr>
         <p:spPr>
           <a:xfrm>
-            <a:off x="4673880" y="1604520"/>
-            <a:ext cx="4015440" cy="3976920"/>
+            <a:off x="4674240" y="1604520"/>
+            <a:ext cx="4015800" cy="3977280"/>
           </a:xfrm>
           <a:prstGeom prst="rect">
             <a:avLst/>
@@ -1051,8 +1051,8 @@
         </p:nvSpPr>
         <p:spPr>
           <a:xfrm>
-            <a:off x="685800" y="2130480"/>
-            <a:ext cx="7771680" cy="1469160"/>
+            <a:off x="457200" y="273600"/>
+            <a:ext cx="8229240" cy="1144800"/>
           </a:xfrm>
           <a:prstGeom prst="rect">
             <a:avLst/>
@@ -1110,8 +1110,8 @@
         </p:nvSpPr>
         <p:spPr>
           <a:xfrm>
-            <a:off x="685800" y="2130480"/>
-            <a:ext cx="7771680" cy="6811560"/>
+            <a:off x="457200" y="273600"/>
+            <a:ext cx="8229240" cy="5307840"/>
           </a:xfrm>
           <a:prstGeom prst="rect">
             <a:avLst/>
@@ -1169,8 +1169,8 @@
         </p:nvSpPr>
         <p:spPr>
           <a:xfrm>
-            <a:off x="685800" y="2130480"/>
-            <a:ext cx="7771680" cy="1469160"/>
+            <a:off x="457200" y="273600"/>
+            <a:ext cx="8229240" cy="1144800"/>
           </a:xfrm>
           <a:prstGeom prst="rect">
             <a:avLst/>
@@ -1207,7 +1207,7 @@
         <p:spPr>
           <a:xfrm>
             <a:off x="457200" y="1604520"/>
-            <a:ext cx="4015440" cy="1896840"/>
+            <a:ext cx="4015800" cy="1896840"/>
           </a:xfrm>
           <a:prstGeom prst="rect">
             <a:avLst/>
@@ -1245,7 +1245,7 @@
         <p:spPr>
           <a:xfrm>
             <a:off x="457200" y="3682080"/>
-            <a:ext cx="4015440" cy="1896840"/>
+            <a:ext cx="4015800" cy="1896840"/>
           </a:xfrm>
           <a:prstGeom prst="rect">
             <a:avLst/>
@@ -1282,8 +1282,8 @@
         </p:nvSpPr>
         <p:spPr>
           <a:xfrm>
-            <a:off x="4673880" y="1604520"/>
-            <a:ext cx="4015440" cy="3976920"/>
+            <a:off x="4674240" y="1604520"/>
+            <a:ext cx="4015800" cy="3977280"/>
           </a:xfrm>
           <a:prstGeom prst="rect">
             <a:avLst/>
@@ -1342,8 +1342,8 @@
         </p:nvSpPr>
         <p:spPr>
           <a:xfrm>
-            <a:off x="685800" y="2130480"/>
-            <a:ext cx="7771680" cy="1469160"/>
+            <a:off x="457200" y="273600"/>
+            <a:ext cx="8229240" cy="1144800"/>
           </a:xfrm>
           <a:prstGeom prst="rect">
             <a:avLst/>
@@ -1380,7 +1380,7 @@
         <p:spPr>
           <a:xfrm>
             <a:off x="457200" y="1604520"/>
-            <a:ext cx="8228880" cy="3976920"/>
+            <a:ext cx="8229240" cy="3977280"/>
           </a:xfrm>
           <a:prstGeom prst="rect">
             <a:avLst/>
@@ -1438,8 +1438,8 @@
         </p:nvSpPr>
         <p:spPr>
           <a:xfrm>
-            <a:off x="685800" y="2130480"/>
-            <a:ext cx="7771680" cy="1469160"/>
+            <a:off x="457200" y="273600"/>
+            <a:ext cx="8229240" cy="1144800"/>
           </a:xfrm>
           <a:prstGeom prst="rect">
             <a:avLst/>
@@ -1476,7 +1476,7 @@
         <p:spPr>
           <a:xfrm>
             <a:off x="457200" y="1604520"/>
-            <a:ext cx="4015440" cy="3976920"/>
+            <a:ext cx="4015800" cy="3977280"/>
           </a:xfrm>
           <a:prstGeom prst="rect">
             <a:avLst/>
@@ -1513,8 +1513,8 @@
         </p:nvSpPr>
         <p:spPr>
           <a:xfrm>
-            <a:off x="4673880" y="1604520"/>
-            <a:ext cx="4015440" cy="1896840"/>
+            <a:off x="4674240" y="1604520"/>
+            <a:ext cx="4015800" cy="1896840"/>
           </a:xfrm>
           <a:prstGeom prst="rect">
             <a:avLst/>
@@ -1551,8 +1551,8 @@
         </p:nvSpPr>
         <p:spPr>
           <a:xfrm>
-            <a:off x="4673880" y="3682080"/>
-            <a:ext cx="4015440" cy="1896840"/>
+            <a:off x="4674240" y="3682080"/>
+            <a:ext cx="4015800" cy="1896840"/>
           </a:xfrm>
           <a:prstGeom prst="rect">
             <a:avLst/>
@@ -1611,8 +1611,8 @@
         </p:nvSpPr>
         <p:spPr>
           <a:xfrm>
-            <a:off x="685800" y="2130480"/>
-            <a:ext cx="7771680" cy="1469160"/>
+            <a:off x="457200" y="273600"/>
+            <a:ext cx="8229240" cy="1144800"/>
           </a:xfrm>
           <a:prstGeom prst="rect">
             <a:avLst/>
@@ -1649,7 +1649,7 @@
         <p:spPr>
           <a:xfrm>
             <a:off x="457200" y="1604520"/>
-            <a:ext cx="4015440" cy="1896840"/>
+            <a:ext cx="4015800" cy="1896840"/>
           </a:xfrm>
           <a:prstGeom prst="rect">
             <a:avLst/>
@@ -1686,8 +1686,8 @@
         </p:nvSpPr>
         <p:spPr>
           <a:xfrm>
-            <a:off x="4673880" y="1604520"/>
-            <a:ext cx="4015440" cy="1896840"/>
+            <a:off x="4674240" y="1604520"/>
+            <a:ext cx="4015800" cy="1896840"/>
           </a:xfrm>
           <a:prstGeom prst="rect">
             <a:avLst/>
@@ -1725,7 +1725,7 @@
         <p:spPr>
           <a:xfrm>
             <a:off x="457200" y="3682080"/>
-            <a:ext cx="8228880" cy="1896840"/>
+            <a:ext cx="8229240" cy="1896840"/>
           </a:xfrm>
           <a:prstGeom prst="rect">
             <a:avLst/>
@@ -1784,8 +1784,8 @@
         </p:nvSpPr>
         <p:spPr>
           <a:xfrm>
-            <a:off x="685800" y="2130480"/>
-            <a:ext cx="7771680" cy="1469160"/>
+            <a:off x="457200" y="273600"/>
+            <a:ext cx="8229240" cy="1144800"/>
           </a:xfrm>
           <a:prstGeom prst="rect">
             <a:avLst/>
@@ -1822,7 +1822,7 @@
         <p:spPr>
           <a:xfrm>
             <a:off x="457200" y="1604520"/>
-            <a:ext cx="8228880" cy="1896840"/>
+            <a:ext cx="8229240" cy="1896840"/>
           </a:xfrm>
           <a:prstGeom prst="rect">
             <a:avLst/>
@@ -1860,7 +1860,7 @@
         <p:spPr>
           <a:xfrm>
             <a:off x="457200" y="3682080"/>
-            <a:ext cx="8228880" cy="1896840"/>
+            <a:ext cx="8229240" cy="1896840"/>
           </a:xfrm>
           <a:prstGeom prst="rect">
             <a:avLst/>
@@ -1919,8 +1919,8 @@
         </p:nvSpPr>
         <p:spPr>
           <a:xfrm>
-            <a:off x="685800" y="2130480"/>
-            <a:ext cx="7771680" cy="1469160"/>
+            <a:off x="457200" y="273600"/>
+            <a:ext cx="8229240" cy="1144800"/>
           </a:xfrm>
           <a:prstGeom prst="rect">
             <a:avLst/>
@@ -1957,7 +1957,7 @@
         <p:spPr>
           <a:xfrm>
             <a:off x="457200" y="1604520"/>
-            <a:ext cx="4015440" cy="1896840"/>
+            <a:ext cx="4015800" cy="1896840"/>
           </a:xfrm>
           <a:prstGeom prst="rect">
             <a:avLst/>
@@ -1994,8 +1994,8 @@
         </p:nvSpPr>
         <p:spPr>
           <a:xfrm>
-            <a:off x="4673880" y="1604520"/>
-            <a:ext cx="4015440" cy="1896840"/>
+            <a:off x="4674240" y="1604520"/>
+            <a:ext cx="4015800" cy="1896840"/>
           </a:xfrm>
           <a:prstGeom prst="rect">
             <a:avLst/>
@@ -2032,8 +2032,8 @@
         </p:nvSpPr>
         <p:spPr>
           <a:xfrm>
-            <a:off x="4673880" y="3682080"/>
-            <a:ext cx="4015440" cy="1896840"/>
+            <a:off x="4674240" y="3682080"/>
+            <a:ext cx="4015800" cy="1896840"/>
           </a:xfrm>
           <a:prstGeom prst="rect">
             <a:avLst/>
@@ -2071,7 +2071,7 @@
         <p:spPr>
           <a:xfrm>
             <a:off x="457200" y="3682080"/>
-            <a:ext cx="4015440" cy="1896840"/>
+            <a:ext cx="4015800" cy="1896840"/>
           </a:xfrm>
           <a:prstGeom prst="rect">
             <a:avLst/>
@@ -2130,8 +2130,8 @@
         </p:nvSpPr>
         <p:spPr>
           <a:xfrm>
-            <a:off x="685800" y="2130480"/>
-            <a:ext cx="7771680" cy="1469160"/>
+            <a:off x="457200" y="273600"/>
+            <a:ext cx="8229240" cy="1144800"/>
           </a:xfrm>
           <a:prstGeom prst="rect">
             <a:avLst/>
@@ -2417,8 +2417,8 @@
         </p:nvSpPr>
         <p:spPr>
           <a:xfrm>
-            <a:off x="685800" y="2130480"/>
-            <a:ext cx="7771680" cy="1469160"/>
+            <a:off x="457200" y="273600"/>
+            <a:ext cx="8229240" cy="1144800"/>
           </a:xfrm>
           <a:prstGeom prst="rect">
             <a:avLst/>
@@ -2455,7 +2455,7 @@
         <p:spPr>
           <a:xfrm>
             <a:off x="457200" y="1604520"/>
-            <a:ext cx="8228880" cy="3976920"/>
+            <a:ext cx="8229240" cy="3977280"/>
           </a:xfrm>
           <a:prstGeom prst="rect">
             <a:avLst/>
@@ -2514,8 +2514,8 @@
         </p:nvSpPr>
         <p:spPr>
           <a:xfrm>
-            <a:off x="685800" y="2130480"/>
-            <a:ext cx="7771680" cy="1469160"/>
+            <a:off x="457200" y="273600"/>
+            <a:ext cx="8229240" cy="1144800"/>
           </a:xfrm>
           <a:prstGeom prst="rect">
             <a:avLst/>
@@ -2552,7 +2552,7 @@
         <p:spPr>
           <a:xfrm>
             <a:off x="457200" y="1604520"/>
-            <a:ext cx="4015440" cy="3976920"/>
+            <a:ext cx="4015800" cy="3977280"/>
           </a:xfrm>
           <a:prstGeom prst="rect">
             <a:avLst/>
@@ -2589,8 +2589,8 @@
         </p:nvSpPr>
         <p:spPr>
           <a:xfrm>
-            <a:off x="4673880" y="1604520"/>
-            <a:ext cx="4015440" cy="3976920"/>
+            <a:off x="4674240" y="1604520"/>
+            <a:ext cx="4015800" cy="3977280"/>
           </a:xfrm>
           <a:prstGeom prst="rect">
             <a:avLst/>
@@ -2649,8 +2649,8 @@
         </p:nvSpPr>
         <p:spPr>
           <a:xfrm>
-            <a:off x="685800" y="2130480"/>
-            <a:ext cx="7771680" cy="1469160"/>
+            <a:off x="457200" y="273600"/>
+            <a:ext cx="8229240" cy="1144800"/>
           </a:xfrm>
           <a:prstGeom prst="rect">
             <a:avLst/>
@@ -2708,8 +2708,8 @@
         </p:nvSpPr>
         <p:spPr>
           <a:xfrm>
-            <a:off x="685800" y="2130480"/>
-            <a:ext cx="7771680" cy="6811560"/>
+            <a:off x="457200" y="273600"/>
+            <a:ext cx="8229240" cy="5307840"/>
           </a:xfrm>
           <a:prstGeom prst="rect">
             <a:avLst/>
@@ -2767,8 +2767,8 @@
         </p:nvSpPr>
         <p:spPr>
           <a:xfrm>
-            <a:off x="685800" y="2130480"/>
-            <a:ext cx="7771680" cy="1469160"/>
+            <a:off x="457200" y="273600"/>
+            <a:ext cx="8229240" cy="1144800"/>
           </a:xfrm>
           <a:prstGeom prst="rect">
             <a:avLst/>
@@ -2805,7 +2805,7 @@
         <p:spPr>
           <a:xfrm>
             <a:off x="457200" y="1604520"/>
-            <a:ext cx="4015440" cy="1896840"/>
+            <a:ext cx="4015800" cy="1896840"/>
           </a:xfrm>
           <a:prstGeom prst="rect">
             <a:avLst/>
@@ -2843,7 +2843,7 @@
         <p:spPr>
           <a:xfrm>
             <a:off x="457200" y="3682080"/>
-            <a:ext cx="4015440" cy="1896840"/>
+            <a:ext cx="4015800" cy="1896840"/>
           </a:xfrm>
           <a:prstGeom prst="rect">
             <a:avLst/>
@@ -2880,8 +2880,8 @@
         </p:nvSpPr>
         <p:spPr>
           <a:xfrm>
-            <a:off x="4673880" y="1604520"/>
-            <a:ext cx="4015440" cy="3976920"/>
+            <a:off x="4674240" y="1604520"/>
+            <a:ext cx="4015800" cy="3977280"/>
           </a:xfrm>
           <a:prstGeom prst="rect">
             <a:avLst/>
@@ -2940,8 +2940,8 @@
         </p:nvSpPr>
         <p:spPr>
           <a:xfrm>
-            <a:off x="685800" y="2130480"/>
-            <a:ext cx="7771680" cy="1469160"/>
+            <a:off x="457200" y="273600"/>
+            <a:ext cx="8229240" cy="1144800"/>
           </a:xfrm>
           <a:prstGeom prst="rect">
             <a:avLst/>
@@ -2978,7 +2978,7 @@
         <p:spPr>
           <a:xfrm>
             <a:off x="457200" y="1604520"/>
-            <a:ext cx="4015440" cy="3976920"/>
+            <a:ext cx="4015800" cy="3977280"/>
           </a:xfrm>
           <a:prstGeom prst="rect">
             <a:avLst/>
@@ -3015,8 +3015,8 @@
         </p:nvSpPr>
         <p:spPr>
           <a:xfrm>
-            <a:off x="4673880" y="1604520"/>
-            <a:ext cx="4015440" cy="1896840"/>
+            <a:off x="4674240" y="1604520"/>
+            <a:ext cx="4015800" cy="1896840"/>
           </a:xfrm>
           <a:prstGeom prst="rect">
             <a:avLst/>
@@ -3053,8 +3053,8 @@
         </p:nvSpPr>
         <p:spPr>
           <a:xfrm>
-            <a:off x="4673880" y="3682080"/>
-            <a:ext cx="4015440" cy="1896840"/>
+            <a:off x="4674240" y="3682080"/>
+            <a:ext cx="4015800" cy="1896840"/>
           </a:xfrm>
           <a:prstGeom prst="rect">
             <a:avLst/>
@@ -3113,8 +3113,8 @@
         </p:nvSpPr>
         <p:spPr>
           <a:xfrm>
-            <a:off x="685800" y="2130480"/>
-            <a:ext cx="7771680" cy="1469160"/>
+            <a:off x="457200" y="273600"/>
+            <a:ext cx="8229240" cy="1144800"/>
           </a:xfrm>
           <a:prstGeom prst="rect">
             <a:avLst/>
@@ -3151,7 +3151,7 @@
         <p:spPr>
           <a:xfrm>
             <a:off x="457200" y="1604520"/>
-            <a:ext cx="4015440" cy="1896840"/>
+            <a:ext cx="4015800" cy="1896840"/>
           </a:xfrm>
           <a:prstGeom prst="rect">
             <a:avLst/>
@@ -3188,8 +3188,8 @@
         </p:nvSpPr>
         <p:spPr>
           <a:xfrm>
-            <a:off x="4673880" y="1604520"/>
-            <a:ext cx="4015440" cy="1896840"/>
+            <a:off x="4674240" y="1604520"/>
+            <a:ext cx="4015800" cy="1896840"/>
           </a:xfrm>
           <a:prstGeom prst="rect">
             <a:avLst/>
@@ -3227,7 +3227,7 @@
         <p:spPr>
           <a:xfrm>
             <a:off x="457200" y="3682080"/>
-            <a:ext cx="8228880" cy="1896840"/>
+            <a:ext cx="8229240" cy="1896840"/>
           </a:xfrm>
           <a:prstGeom prst="rect">
             <a:avLst/>
@@ -3294,7 +3294,7 @@
         <p:spPr>
           <a:xfrm>
             <a:off x="685800" y="2130480"/>
-            <a:ext cx="7771680" cy="1469160"/>
+            <a:ext cx="7771320" cy="1468800"/>
           </a:xfrm>
           <a:prstGeom prst="rect">
             <a:avLst/>
@@ -3315,469 +3315,7 @@
                 </a:uFill>
                 <a:latin typeface="Arial"/>
               </a:rPr>
-              <a:t>C</a:t>
-            </a:r>
-            <a:r>
-              <a:rPr b="0" lang="fr-FR" sz="1800" spc="-1" strike="noStrike">
-                <a:solidFill>
-                  <a:srgbClr val="000000"/>
-                </a:solidFill>
-                <a:uFill>
-                  <a:solidFill>
-                    <a:srgbClr val="ffffff"/>
-                  </a:solidFill>
-                </a:uFill>
-                <a:latin typeface="Arial"/>
-              </a:rPr>
-              <a:t>li</a:t>
-            </a:r>
-            <a:r>
-              <a:rPr b="0" lang="fr-FR" sz="1800" spc="-1" strike="noStrike">
-                <a:solidFill>
-                  <a:srgbClr val="000000"/>
-                </a:solidFill>
-                <a:uFill>
-                  <a:solidFill>
-                    <a:srgbClr val="ffffff"/>
-                  </a:solidFill>
-                </a:uFill>
-                <a:latin typeface="Arial"/>
-              </a:rPr>
-              <a:t>q</a:t>
-            </a:r>
-            <a:r>
-              <a:rPr b="0" lang="fr-FR" sz="1800" spc="-1" strike="noStrike">
-                <a:solidFill>
-                  <a:srgbClr val="000000"/>
-                </a:solidFill>
-                <a:uFill>
-                  <a:solidFill>
-                    <a:srgbClr val="ffffff"/>
-                  </a:solidFill>
-                </a:uFill>
-                <a:latin typeface="Arial"/>
-              </a:rPr>
-              <a:t>u</a:t>
-            </a:r>
-            <a:r>
-              <a:rPr b="0" lang="fr-FR" sz="1800" spc="-1" strike="noStrike">
-                <a:solidFill>
-                  <a:srgbClr val="000000"/>
-                </a:solidFill>
-                <a:uFill>
-                  <a:solidFill>
-                    <a:srgbClr val="ffffff"/>
-                  </a:solidFill>
-                </a:uFill>
-                <a:latin typeface="Arial"/>
-              </a:rPr>
-              <a:t>e</a:t>
-            </a:r>
-            <a:r>
-              <a:rPr b="0" lang="fr-FR" sz="1800" spc="-1" strike="noStrike">
-                <a:solidFill>
-                  <a:srgbClr val="000000"/>
-                </a:solidFill>
-                <a:uFill>
-                  <a:solidFill>
-                    <a:srgbClr val="ffffff"/>
-                  </a:solidFill>
-                </a:uFill>
-                <a:latin typeface="Arial"/>
-              </a:rPr>
-              <a:t>z </a:t>
-            </a:r>
-            <a:r>
-              <a:rPr b="0" lang="fr-FR" sz="1800" spc="-1" strike="noStrike">
-                <a:solidFill>
-                  <a:srgbClr val="000000"/>
-                </a:solidFill>
-                <a:uFill>
-                  <a:solidFill>
-                    <a:srgbClr val="ffffff"/>
-                  </a:solidFill>
-                </a:uFill>
-                <a:latin typeface="Arial"/>
-              </a:rPr>
-              <a:t>p</a:t>
-            </a:r>
-            <a:r>
-              <a:rPr b="0" lang="fr-FR" sz="1800" spc="-1" strike="noStrike">
-                <a:solidFill>
-                  <a:srgbClr val="000000"/>
-                </a:solidFill>
-                <a:uFill>
-                  <a:solidFill>
-                    <a:srgbClr val="ffffff"/>
-                  </a:solidFill>
-                </a:uFill>
-                <a:latin typeface="Arial"/>
-              </a:rPr>
-              <a:t>o</a:t>
-            </a:r>
-            <a:r>
-              <a:rPr b="0" lang="fr-FR" sz="1800" spc="-1" strike="noStrike">
-                <a:solidFill>
-                  <a:srgbClr val="000000"/>
-                </a:solidFill>
-                <a:uFill>
-                  <a:solidFill>
-                    <a:srgbClr val="ffffff"/>
-                  </a:solidFill>
-                </a:uFill>
-                <a:latin typeface="Arial"/>
-              </a:rPr>
-              <a:t>u</a:t>
-            </a:r>
-            <a:r>
-              <a:rPr b="0" lang="fr-FR" sz="1800" spc="-1" strike="noStrike">
-                <a:solidFill>
-                  <a:srgbClr val="000000"/>
-                </a:solidFill>
-                <a:uFill>
-                  <a:solidFill>
-                    <a:srgbClr val="ffffff"/>
-                  </a:solidFill>
-                </a:uFill>
-                <a:latin typeface="Arial"/>
-              </a:rPr>
-              <a:t>r </a:t>
-            </a:r>
-            <a:r>
-              <a:rPr b="0" lang="fr-FR" sz="1800" spc="-1" strike="noStrike">
-                <a:solidFill>
-                  <a:srgbClr val="000000"/>
-                </a:solidFill>
-                <a:uFill>
-                  <a:solidFill>
-                    <a:srgbClr val="ffffff"/>
-                  </a:solidFill>
-                </a:uFill>
-                <a:latin typeface="Arial"/>
-              </a:rPr>
-              <a:t>é</a:t>
-            </a:r>
-            <a:r>
-              <a:rPr b="0" lang="fr-FR" sz="1800" spc="-1" strike="noStrike">
-                <a:solidFill>
-                  <a:srgbClr val="000000"/>
-                </a:solidFill>
-                <a:uFill>
-                  <a:solidFill>
-                    <a:srgbClr val="ffffff"/>
-                  </a:solidFill>
-                </a:uFill>
-                <a:latin typeface="Arial"/>
-              </a:rPr>
-              <a:t>d</a:t>
-            </a:r>
-            <a:r>
-              <a:rPr b="0" lang="fr-FR" sz="1800" spc="-1" strike="noStrike">
-                <a:solidFill>
-                  <a:srgbClr val="000000"/>
-                </a:solidFill>
-                <a:uFill>
-                  <a:solidFill>
-                    <a:srgbClr val="ffffff"/>
-                  </a:solidFill>
-                </a:uFill>
-                <a:latin typeface="Arial"/>
-              </a:rPr>
-              <a:t>it</a:t>
-            </a:r>
-            <a:r>
-              <a:rPr b="0" lang="fr-FR" sz="1800" spc="-1" strike="noStrike">
-                <a:solidFill>
-                  <a:srgbClr val="000000"/>
-                </a:solidFill>
-                <a:uFill>
-                  <a:solidFill>
-                    <a:srgbClr val="ffffff"/>
-                  </a:solidFill>
-                </a:uFill>
-                <a:latin typeface="Arial"/>
-              </a:rPr>
-              <a:t>e</a:t>
-            </a:r>
-            <a:r>
-              <a:rPr b="0" lang="fr-FR" sz="1800" spc="-1" strike="noStrike">
-                <a:solidFill>
-                  <a:srgbClr val="000000"/>
-                </a:solidFill>
-                <a:uFill>
-                  <a:solidFill>
-                    <a:srgbClr val="ffffff"/>
-                  </a:solidFill>
-                </a:uFill>
-                <a:latin typeface="Arial"/>
-              </a:rPr>
-              <a:t>r </a:t>
-            </a:r>
-            <a:r>
-              <a:rPr b="0" lang="fr-FR" sz="1800" spc="-1" strike="noStrike">
-                <a:solidFill>
-                  <a:srgbClr val="000000"/>
-                </a:solidFill>
-                <a:uFill>
-                  <a:solidFill>
-                    <a:srgbClr val="ffffff"/>
-                  </a:solidFill>
-                </a:uFill>
-                <a:latin typeface="Arial"/>
-              </a:rPr>
-              <a:t>l</a:t>
-            </a:r>
-            <a:r>
-              <a:rPr b="0" lang="fr-FR" sz="1800" spc="-1" strike="noStrike">
-                <a:solidFill>
-                  <a:srgbClr val="000000"/>
-                </a:solidFill>
-                <a:uFill>
-                  <a:solidFill>
-                    <a:srgbClr val="ffffff"/>
-                  </a:solidFill>
-                </a:uFill>
-                <a:latin typeface="Arial"/>
-              </a:rPr>
-              <a:t>e </a:t>
-            </a:r>
-            <a:r>
-              <a:rPr b="0" lang="fr-FR" sz="1800" spc="-1" strike="noStrike">
-                <a:solidFill>
-                  <a:srgbClr val="000000"/>
-                </a:solidFill>
-                <a:uFill>
-                  <a:solidFill>
-                    <a:srgbClr val="ffffff"/>
-                  </a:solidFill>
-                </a:uFill>
-                <a:latin typeface="Arial"/>
-              </a:rPr>
-              <a:t>f</a:t>
-            </a:r>
-            <a:r>
-              <a:rPr b="0" lang="fr-FR" sz="1800" spc="-1" strike="noStrike">
-                <a:solidFill>
-                  <a:srgbClr val="000000"/>
-                </a:solidFill>
-                <a:uFill>
-                  <a:solidFill>
-                    <a:srgbClr val="ffffff"/>
-                  </a:solidFill>
-                </a:uFill>
-                <a:latin typeface="Arial"/>
-              </a:rPr>
-              <a:t>o</a:t>
-            </a:r>
-            <a:r>
-              <a:rPr b="0" lang="fr-FR" sz="1800" spc="-1" strike="noStrike">
-                <a:solidFill>
-                  <a:srgbClr val="000000"/>
-                </a:solidFill>
-                <a:uFill>
-                  <a:solidFill>
-                    <a:srgbClr val="ffffff"/>
-                  </a:solidFill>
-                </a:uFill>
-                <a:latin typeface="Arial"/>
-              </a:rPr>
-              <a:t>r</a:t>
-            </a:r>
-            <a:r>
-              <a:rPr b="0" lang="fr-FR" sz="1800" spc="-1" strike="noStrike">
-                <a:solidFill>
-                  <a:srgbClr val="000000"/>
-                </a:solidFill>
-                <a:uFill>
-                  <a:solidFill>
-                    <a:srgbClr val="ffffff"/>
-                  </a:solidFill>
-                </a:uFill>
-                <a:latin typeface="Arial"/>
-              </a:rPr>
-              <a:t>m</a:t>
-            </a:r>
-            <a:r>
-              <a:rPr b="0" lang="fr-FR" sz="1800" spc="-1" strike="noStrike">
-                <a:solidFill>
-                  <a:srgbClr val="000000"/>
-                </a:solidFill>
-                <a:uFill>
-                  <a:solidFill>
-                    <a:srgbClr val="ffffff"/>
-                  </a:solidFill>
-                </a:uFill>
-                <a:latin typeface="Arial"/>
-              </a:rPr>
-              <a:t>a</a:t>
-            </a:r>
-            <a:r>
-              <a:rPr b="0" lang="fr-FR" sz="1800" spc="-1" strike="noStrike">
-                <a:solidFill>
-                  <a:srgbClr val="000000"/>
-                </a:solidFill>
-                <a:uFill>
-                  <a:solidFill>
-                    <a:srgbClr val="ffffff"/>
-                  </a:solidFill>
-                </a:uFill>
-                <a:latin typeface="Arial"/>
-              </a:rPr>
-              <a:t>t </a:t>
-            </a:r>
-            <a:r>
-              <a:rPr b="0" lang="fr-FR" sz="1800" spc="-1" strike="noStrike">
-                <a:solidFill>
-                  <a:srgbClr val="000000"/>
-                </a:solidFill>
-                <a:uFill>
-                  <a:solidFill>
-                    <a:srgbClr val="ffffff"/>
-                  </a:solidFill>
-                </a:uFill>
-                <a:latin typeface="Arial"/>
-              </a:rPr>
-              <a:t>d</a:t>
-            </a:r>
-            <a:r>
-              <a:rPr b="0" lang="fr-FR" sz="1800" spc="-1" strike="noStrike">
-                <a:solidFill>
-                  <a:srgbClr val="000000"/>
-                </a:solidFill>
-                <a:uFill>
-                  <a:solidFill>
-                    <a:srgbClr val="ffffff"/>
-                  </a:solidFill>
-                </a:uFill>
-                <a:latin typeface="Arial"/>
-              </a:rPr>
-              <a:t>u </a:t>
-            </a:r>
-            <a:r>
-              <a:rPr b="0" lang="fr-FR" sz="1800" spc="-1" strike="noStrike">
-                <a:solidFill>
-                  <a:srgbClr val="000000"/>
-                </a:solidFill>
-                <a:uFill>
-                  <a:solidFill>
-                    <a:srgbClr val="ffffff"/>
-                  </a:solidFill>
-                </a:uFill>
-                <a:latin typeface="Arial"/>
-              </a:rPr>
-              <a:t>t</a:t>
-            </a:r>
-            <a:r>
-              <a:rPr b="0" lang="fr-FR" sz="1800" spc="-1" strike="noStrike">
-                <a:solidFill>
-                  <a:srgbClr val="000000"/>
-                </a:solidFill>
-                <a:uFill>
-                  <a:solidFill>
-                    <a:srgbClr val="ffffff"/>
-                  </a:solidFill>
-                </a:uFill>
-                <a:latin typeface="Arial"/>
-              </a:rPr>
-              <a:t>e</a:t>
-            </a:r>
-            <a:r>
-              <a:rPr b="0" lang="fr-FR" sz="1800" spc="-1" strike="noStrike">
-                <a:solidFill>
-                  <a:srgbClr val="000000"/>
-                </a:solidFill>
-                <a:uFill>
-                  <a:solidFill>
-                    <a:srgbClr val="ffffff"/>
-                  </a:solidFill>
-                </a:uFill>
-                <a:latin typeface="Arial"/>
-              </a:rPr>
-              <a:t>x</a:t>
-            </a:r>
-            <a:r>
-              <a:rPr b="0" lang="fr-FR" sz="1800" spc="-1" strike="noStrike">
-                <a:solidFill>
-                  <a:srgbClr val="000000"/>
-                </a:solidFill>
-                <a:uFill>
-                  <a:solidFill>
-                    <a:srgbClr val="ffffff"/>
-                  </a:solidFill>
-                </a:uFill>
-                <a:latin typeface="Arial"/>
-              </a:rPr>
-              <a:t>t</a:t>
-            </a:r>
-            <a:r>
-              <a:rPr b="0" lang="fr-FR" sz="1800" spc="-1" strike="noStrike">
-                <a:solidFill>
-                  <a:srgbClr val="000000"/>
-                </a:solidFill>
-                <a:uFill>
-                  <a:solidFill>
-                    <a:srgbClr val="ffffff"/>
-                  </a:solidFill>
-                </a:uFill>
-                <a:latin typeface="Arial"/>
-              </a:rPr>
-              <a:t>e</a:t>
-            </a:r>
-            <a:r>
-              <a:rPr b="0" lang="fr-FR" sz="1800" spc="-1" strike="noStrike">
-                <a:solidFill>
-                  <a:srgbClr val="000000"/>
-                </a:solidFill>
-                <a:uFill>
-                  <a:solidFill>
-                    <a:srgbClr val="ffffff"/>
-                  </a:solidFill>
-                </a:uFill>
-                <a:latin typeface="Arial"/>
-              </a:rPr>
-              <a:t>-</a:t>
-            </a:r>
-            <a:r>
-              <a:rPr b="0" lang="fr-FR" sz="1800" spc="-1" strike="noStrike">
-                <a:solidFill>
-                  <a:srgbClr val="000000"/>
-                </a:solidFill>
-                <a:uFill>
-                  <a:solidFill>
-                    <a:srgbClr val="ffffff"/>
-                  </a:solidFill>
-                </a:uFill>
-                <a:latin typeface="Arial"/>
-              </a:rPr>
-              <a:t>ti</a:t>
-            </a:r>
-            <a:r>
-              <a:rPr b="0" lang="fr-FR" sz="1800" spc="-1" strike="noStrike">
-                <a:solidFill>
-                  <a:srgbClr val="000000"/>
-                </a:solidFill>
-                <a:uFill>
-                  <a:solidFill>
-                    <a:srgbClr val="ffffff"/>
-                  </a:solidFill>
-                </a:uFill>
-                <a:latin typeface="Arial"/>
-              </a:rPr>
-              <a:t>tr</a:t>
-            </a:r>
-            <a:r>
-              <a:rPr b="0" lang="fr-FR" sz="1800" spc="-1" strike="noStrike">
-                <a:solidFill>
-                  <a:srgbClr val="000000"/>
-                </a:solidFill>
-                <a:uFill>
-                  <a:solidFill>
-                    <a:srgbClr val="ffffff"/>
-                  </a:solidFill>
-                </a:uFill>
-                <a:latin typeface="Arial"/>
-              </a:rPr>
-              <a:t>e</a:t>
+              <a:t>Cliquez pour éditer le format du texte-titre</a:t>
             </a:r>
             <a:endParaRPr b="0" lang="fr-FR" sz="1800" spc="-1" strike="noStrike">
               <a:solidFill>
@@ -3806,7 +3344,7 @@
         <p:spPr>
           <a:xfrm>
             <a:off x="457200" y="1604520"/>
-            <a:ext cx="8229240" cy="3977280"/>
+            <a:ext cx="8228520" cy="3976560"/>
           </a:xfrm>
           <a:prstGeom prst="rect">
             <a:avLst/>
@@ -3829,7 +3367,7 @@
               <a:buChar char=""/>
             </a:pPr>
             <a:r>
-              <a:rPr b="0" lang="fr-FR" sz="3200" spc="-1" strike="noStrike">
+              <a:rPr b="0" lang="fr-FR" sz="1800" spc="-1" strike="noStrike">
                 <a:solidFill>
                   <a:srgbClr val="000000"/>
                 </a:solidFill>
@@ -3842,7 +3380,7 @@
               </a:rPr>
               <a:t>Cliquez pour éditer le format du plan de texte</a:t>
             </a:r>
-            <a:endParaRPr b="0" lang="fr-FR" sz="3200" spc="-1" strike="noStrike">
+            <a:endParaRPr b="0" lang="fr-FR" sz="1800" spc="-1" strike="noStrike">
               <a:solidFill>
                 <a:srgbClr val="000000"/>
               </a:solidFill>
@@ -3867,7 +3405,7 @@
               <a:buChar char=""/>
             </a:pPr>
             <a:r>
-              <a:rPr b="0" lang="fr-FR" sz="2800" spc="-1" strike="noStrike">
+              <a:rPr b="0" lang="fr-FR" sz="1800" spc="-1" strike="noStrike">
                 <a:solidFill>
                   <a:srgbClr val="000000"/>
                 </a:solidFill>
@@ -3880,7 +3418,7 @@
               </a:rPr>
               <a:t>Second niveau de plan</a:t>
             </a:r>
-            <a:endParaRPr b="0" lang="fr-FR" sz="2800" spc="-1" strike="noStrike">
+            <a:endParaRPr b="0" lang="fr-FR" sz="1800" spc="-1" strike="noStrike">
               <a:solidFill>
                 <a:srgbClr val="000000"/>
               </a:solidFill>
@@ -3905,7 +3443,7 @@
               <a:buChar char=""/>
             </a:pPr>
             <a:r>
-              <a:rPr b="0" lang="fr-FR" sz="2400" spc="-1" strike="noStrike">
+              <a:rPr b="0" lang="fr-FR" sz="1800" spc="-1" strike="noStrike">
                 <a:solidFill>
                   <a:srgbClr val="000000"/>
                 </a:solidFill>
@@ -3918,7 +3456,7 @@
               </a:rPr>
               <a:t>Troisième niveau de plan</a:t>
             </a:r>
-            <a:endParaRPr b="0" lang="fr-FR" sz="2400" spc="-1" strike="noStrike">
+            <a:endParaRPr b="0" lang="fr-FR" sz="1800" spc="-1" strike="noStrike">
               <a:solidFill>
                 <a:srgbClr val="000000"/>
               </a:solidFill>
@@ -3943,7 +3481,7 @@
               <a:buChar char=""/>
             </a:pPr>
             <a:r>
-              <a:rPr b="0" lang="fr-FR" sz="2000" spc="-1" strike="noStrike">
+              <a:rPr b="0" lang="fr-FR" sz="1800" spc="-1" strike="noStrike">
                 <a:solidFill>
                   <a:srgbClr val="000000"/>
                 </a:solidFill>
@@ -3956,7 +3494,7 @@
               </a:rPr>
               <a:t>Quatrième niveau de plan</a:t>
             </a:r>
-            <a:endParaRPr b="0" lang="fr-FR" sz="2000" spc="-1" strike="noStrike">
+            <a:endParaRPr b="0" lang="fr-FR" sz="1800" spc="-1" strike="noStrike">
               <a:solidFill>
                 <a:srgbClr val="000000"/>
               </a:solidFill>
@@ -3981,7 +3519,7 @@
               <a:buChar char=""/>
             </a:pPr>
             <a:r>
-              <a:rPr b="0" lang="fr-FR" sz="2000" spc="-1" strike="noStrike">
+              <a:rPr b="0" lang="fr-FR" sz="1800" spc="-1" strike="noStrike">
                 <a:solidFill>
                   <a:srgbClr val="000000"/>
                 </a:solidFill>
@@ -3994,7 +3532,7 @@
               </a:rPr>
               <a:t>Cinquième niveau de plan</a:t>
             </a:r>
-            <a:endParaRPr b="0" lang="fr-FR" sz="2000" spc="-1" strike="noStrike">
+            <a:endParaRPr b="0" lang="fr-FR" sz="1800" spc="-1" strike="noStrike">
               <a:solidFill>
                 <a:srgbClr val="000000"/>
               </a:solidFill>
@@ -4019,7 +3557,7 @@
               <a:buChar char=""/>
             </a:pPr>
             <a:r>
-              <a:rPr b="0" lang="fr-FR" sz="2000" spc="-1" strike="noStrike">
+              <a:rPr b="0" lang="fr-FR" sz="1800" spc="-1" strike="noStrike">
                 <a:solidFill>
                   <a:srgbClr val="000000"/>
                 </a:solidFill>
@@ -4032,7 +3570,7 @@
               </a:rPr>
               <a:t>Sixième niveau de plan</a:t>
             </a:r>
-            <a:endParaRPr b="0" lang="fr-FR" sz="2000" spc="-1" strike="noStrike">
+            <a:endParaRPr b="0" lang="fr-FR" sz="1800" spc="-1" strike="noStrike">
               <a:solidFill>
                 <a:srgbClr val="000000"/>
               </a:solidFill>
@@ -4057,7 +3595,7 @@
               <a:buChar char=""/>
             </a:pPr>
             <a:r>
-              <a:rPr b="0" lang="fr-FR" sz="2000" spc="-1" strike="noStrike">
+              <a:rPr b="0" lang="fr-FR" sz="1800" spc="-1" strike="noStrike">
                 <a:solidFill>
                   <a:srgbClr val="000000"/>
                 </a:solidFill>
@@ -4070,7 +3608,7 @@
               </a:rPr>
               <a:t>Septième niveau de plan</a:t>
             </a:r>
-            <a:endParaRPr b="0" lang="fr-FR" sz="2000" spc="-1" strike="noStrike">
+            <a:endParaRPr b="0" lang="fr-FR" sz="1800" spc="-1" strike="noStrike">
               <a:solidFill>
                 <a:srgbClr val="000000"/>
               </a:solidFill>
@@ -4140,8 +3678,8 @@
         </p:nvSpPr>
         <p:spPr>
           <a:xfrm>
-            <a:off x="685800" y="2130480"/>
-            <a:ext cx="7771680" cy="1469160"/>
+            <a:off x="457200" y="273600"/>
+            <a:ext cx="8229240" cy="1144800"/>
           </a:xfrm>
           <a:prstGeom prst="rect">
             <a:avLst/>
@@ -4150,8 +3688,9 @@
         <p:txBody>
           <a:bodyPr lIns="0" rIns="0" tIns="0" bIns="0" anchor="ctr"/>
           <a:p>
+            <a:pPr algn="ctr"/>
             <a:r>
-              <a:rPr b="0" lang="fr-FR" sz="1800" spc="-1" strike="noStrike">
+              <a:rPr b="0" lang="fr-FR" sz="4400" spc="-1" strike="noStrike">
                 <a:solidFill>
                   <a:srgbClr val="000000"/>
                 </a:solidFill>
@@ -4162,471 +3701,9 @@
                 </a:uFill>
                 <a:latin typeface="Arial"/>
               </a:rPr>
-              <a:t>C</a:t>
+              <a:t>Cliquez pour éditer le format du texte-titre</a:t>
             </a:r>
-            <a:r>
-              <a:rPr b="0" lang="fr-FR" sz="1800" spc="-1" strike="noStrike">
-                <a:solidFill>
-                  <a:srgbClr val="000000"/>
-                </a:solidFill>
-                <a:uFill>
-                  <a:solidFill>
-                    <a:srgbClr val="ffffff"/>
-                  </a:solidFill>
-                </a:uFill>
-                <a:latin typeface="Arial"/>
-              </a:rPr>
-              <a:t>li</a:t>
-            </a:r>
-            <a:r>
-              <a:rPr b="0" lang="fr-FR" sz="1800" spc="-1" strike="noStrike">
-                <a:solidFill>
-                  <a:srgbClr val="000000"/>
-                </a:solidFill>
-                <a:uFill>
-                  <a:solidFill>
-                    <a:srgbClr val="ffffff"/>
-                  </a:solidFill>
-                </a:uFill>
-                <a:latin typeface="Arial"/>
-              </a:rPr>
-              <a:t>q</a:t>
-            </a:r>
-            <a:r>
-              <a:rPr b="0" lang="fr-FR" sz="1800" spc="-1" strike="noStrike">
-                <a:solidFill>
-                  <a:srgbClr val="000000"/>
-                </a:solidFill>
-                <a:uFill>
-                  <a:solidFill>
-                    <a:srgbClr val="ffffff"/>
-                  </a:solidFill>
-                </a:uFill>
-                <a:latin typeface="Arial"/>
-              </a:rPr>
-              <a:t>u</a:t>
-            </a:r>
-            <a:r>
-              <a:rPr b="0" lang="fr-FR" sz="1800" spc="-1" strike="noStrike">
-                <a:solidFill>
-                  <a:srgbClr val="000000"/>
-                </a:solidFill>
-                <a:uFill>
-                  <a:solidFill>
-                    <a:srgbClr val="ffffff"/>
-                  </a:solidFill>
-                </a:uFill>
-                <a:latin typeface="Arial"/>
-              </a:rPr>
-              <a:t>e</a:t>
-            </a:r>
-            <a:r>
-              <a:rPr b="0" lang="fr-FR" sz="1800" spc="-1" strike="noStrike">
-                <a:solidFill>
-                  <a:srgbClr val="000000"/>
-                </a:solidFill>
-                <a:uFill>
-                  <a:solidFill>
-                    <a:srgbClr val="ffffff"/>
-                  </a:solidFill>
-                </a:uFill>
-                <a:latin typeface="Arial"/>
-              </a:rPr>
-              <a:t>z </a:t>
-            </a:r>
-            <a:r>
-              <a:rPr b="0" lang="fr-FR" sz="1800" spc="-1" strike="noStrike">
-                <a:solidFill>
-                  <a:srgbClr val="000000"/>
-                </a:solidFill>
-                <a:uFill>
-                  <a:solidFill>
-                    <a:srgbClr val="ffffff"/>
-                  </a:solidFill>
-                </a:uFill>
-                <a:latin typeface="Arial"/>
-              </a:rPr>
-              <a:t>p</a:t>
-            </a:r>
-            <a:r>
-              <a:rPr b="0" lang="fr-FR" sz="1800" spc="-1" strike="noStrike">
-                <a:solidFill>
-                  <a:srgbClr val="000000"/>
-                </a:solidFill>
-                <a:uFill>
-                  <a:solidFill>
-                    <a:srgbClr val="ffffff"/>
-                  </a:solidFill>
-                </a:uFill>
-                <a:latin typeface="Arial"/>
-              </a:rPr>
-              <a:t>o</a:t>
-            </a:r>
-            <a:r>
-              <a:rPr b="0" lang="fr-FR" sz="1800" spc="-1" strike="noStrike">
-                <a:solidFill>
-                  <a:srgbClr val="000000"/>
-                </a:solidFill>
-                <a:uFill>
-                  <a:solidFill>
-                    <a:srgbClr val="ffffff"/>
-                  </a:solidFill>
-                </a:uFill>
-                <a:latin typeface="Arial"/>
-              </a:rPr>
-              <a:t>u</a:t>
-            </a:r>
-            <a:r>
-              <a:rPr b="0" lang="fr-FR" sz="1800" spc="-1" strike="noStrike">
-                <a:solidFill>
-                  <a:srgbClr val="000000"/>
-                </a:solidFill>
-                <a:uFill>
-                  <a:solidFill>
-                    <a:srgbClr val="ffffff"/>
-                  </a:solidFill>
-                </a:uFill>
-                <a:latin typeface="Arial"/>
-              </a:rPr>
-              <a:t>r </a:t>
-            </a:r>
-            <a:r>
-              <a:rPr b="0" lang="fr-FR" sz="1800" spc="-1" strike="noStrike">
-                <a:solidFill>
-                  <a:srgbClr val="000000"/>
-                </a:solidFill>
-                <a:uFill>
-                  <a:solidFill>
-                    <a:srgbClr val="ffffff"/>
-                  </a:solidFill>
-                </a:uFill>
-                <a:latin typeface="Arial"/>
-              </a:rPr>
-              <a:t>é</a:t>
-            </a:r>
-            <a:r>
-              <a:rPr b="0" lang="fr-FR" sz="1800" spc="-1" strike="noStrike">
-                <a:solidFill>
-                  <a:srgbClr val="000000"/>
-                </a:solidFill>
-                <a:uFill>
-                  <a:solidFill>
-                    <a:srgbClr val="ffffff"/>
-                  </a:solidFill>
-                </a:uFill>
-                <a:latin typeface="Arial"/>
-              </a:rPr>
-              <a:t>d</a:t>
-            </a:r>
-            <a:r>
-              <a:rPr b="0" lang="fr-FR" sz="1800" spc="-1" strike="noStrike">
-                <a:solidFill>
-                  <a:srgbClr val="000000"/>
-                </a:solidFill>
-                <a:uFill>
-                  <a:solidFill>
-                    <a:srgbClr val="ffffff"/>
-                  </a:solidFill>
-                </a:uFill>
-                <a:latin typeface="Arial"/>
-              </a:rPr>
-              <a:t>it</a:t>
-            </a:r>
-            <a:r>
-              <a:rPr b="0" lang="fr-FR" sz="1800" spc="-1" strike="noStrike">
-                <a:solidFill>
-                  <a:srgbClr val="000000"/>
-                </a:solidFill>
-                <a:uFill>
-                  <a:solidFill>
-                    <a:srgbClr val="ffffff"/>
-                  </a:solidFill>
-                </a:uFill>
-                <a:latin typeface="Arial"/>
-              </a:rPr>
-              <a:t>e</a:t>
-            </a:r>
-            <a:r>
-              <a:rPr b="0" lang="fr-FR" sz="1800" spc="-1" strike="noStrike">
-                <a:solidFill>
-                  <a:srgbClr val="000000"/>
-                </a:solidFill>
-                <a:uFill>
-                  <a:solidFill>
-                    <a:srgbClr val="ffffff"/>
-                  </a:solidFill>
-                </a:uFill>
-                <a:latin typeface="Arial"/>
-              </a:rPr>
-              <a:t>r </a:t>
-            </a:r>
-            <a:r>
-              <a:rPr b="0" lang="fr-FR" sz="1800" spc="-1" strike="noStrike">
-                <a:solidFill>
-                  <a:srgbClr val="000000"/>
-                </a:solidFill>
-                <a:uFill>
-                  <a:solidFill>
-                    <a:srgbClr val="ffffff"/>
-                  </a:solidFill>
-                </a:uFill>
-                <a:latin typeface="Arial"/>
-              </a:rPr>
-              <a:t>l</a:t>
-            </a:r>
-            <a:r>
-              <a:rPr b="0" lang="fr-FR" sz="1800" spc="-1" strike="noStrike">
-                <a:solidFill>
-                  <a:srgbClr val="000000"/>
-                </a:solidFill>
-                <a:uFill>
-                  <a:solidFill>
-                    <a:srgbClr val="ffffff"/>
-                  </a:solidFill>
-                </a:uFill>
-                <a:latin typeface="Arial"/>
-              </a:rPr>
-              <a:t>e </a:t>
-            </a:r>
-            <a:r>
-              <a:rPr b="0" lang="fr-FR" sz="1800" spc="-1" strike="noStrike">
-                <a:solidFill>
-                  <a:srgbClr val="000000"/>
-                </a:solidFill>
-                <a:uFill>
-                  <a:solidFill>
-                    <a:srgbClr val="ffffff"/>
-                  </a:solidFill>
-                </a:uFill>
-                <a:latin typeface="Arial"/>
-              </a:rPr>
-              <a:t>f</a:t>
-            </a:r>
-            <a:r>
-              <a:rPr b="0" lang="fr-FR" sz="1800" spc="-1" strike="noStrike">
-                <a:solidFill>
-                  <a:srgbClr val="000000"/>
-                </a:solidFill>
-                <a:uFill>
-                  <a:solidFill>
-                    <a:srgbClr val="ffffff"/>
-                  </a:solidFill>
-                </a:uFill>
-                <a:latin typeface="Arial"/>
-              </a:rPr>
-              <a:t>o</a:t>
-            </a:r>
-            <a:r>
-              <a:rPr b="0" lang="fr-FR" sz="1800" spc="-1" strike="noStrike">
-                <a:solidFill>
-                  <a:srgbClr val="000000"/>
-                </a:solidFill>
-                <a:uFill>
-                  <a:solidFill>
-                    <a:srgbClr val="ffffff"/>
-                  </a:solidFill>
-                </a:uFill>
-                <a:latin typeface="Arial"/>
-              </a:rPr>
-              <a:t>r</a:t>
-            </a:r>
-            <a:r>
-              <a:rPr b="0" lang="fr-FR" sz="1800" spc="-1" strike="noStrike">
-                <a:solidFill>
-                  <a:srgbClr val="000000"/>
-                </a:solidFill>
-                <a:uFill>
-                  <a:solidFill>
-                    <a:srgbClr val="ffffff"/>
-                  </a:solidFill>
-                </a:uFill>
-                <a:latin typeface="Arial"/>
-              </a:rPr>
-              <a:t>m</a:t>
-            </a:r>
-            <a:r>
-              <a:rPr b="0" lang="fr-FR" sz="1800" spc="-1" strike="noStrike">
-                <a:solidFill>
-                  <a:srgbClr val="000000"/>
-                </a:solidFill>
-                <a:uFill>
-                  <a:solidFill>
-                    <a:srgbClr val="ffffff"/>
-                  </a:solidFill>
-                </a:uFill>
-                <a:latin typeface="Arial"/>
-              </a:rPr>
-              <a:t>a</a:t>
-            </a:r>
-            <a:r>
-              <a:rPr b="0" lang="fr-FR" sz="1800" spc="-1" strike="noStrike">
-                <a:solidFill>
-                  <a:srgbClr val="000000"/>
-                </a:solidFill>
-                <a:uFill>
-                  <a:solidFill>
-                    <a:srgbClr val="ffffff"/>
-                  </a:solidFill>
-                </a:uFill>
-                <a:latin typeface="Arial"/>
-              </a:rPr>
-              <a:t>t </a:t>
-            </a:r>
-            <a:r>
-              <a:rPr b="0" lang="fr-FR" sz="1800" spc="-1" strike="noStrike">
-                <a:solidFill>
-                  <a:srgbClr val="000000"/>
-                </a:solidFill>
-                <a:uFill>
-                  <a:solidFill>
-                    <a:srgbClr val="ffffff"/>
-                  </a:solidFill>
-                </a:uFill>
-                <a:latin typeface="Arial"/>
-              </a:rPr>
-              <a:t>d</a:t>
-            </a:r>
-            <a:r>
-              <a:rPr b="0" lang="fr-FR" sz="1800" spc="-1" strike="noStrike">
-                <a:solidFill>
-                  <a:srgbClr val="000000"/>
-                </a:solidFill>
-                <a:uFill>
-                  <a:solidFill>
-                    <a:srgbClr val="ffffff"/>
-                  </a:solidFill>
-                </a:uFill>
-                <a:latin typeface="Arial"/>
-              </a:rPr>
-              <a:t>u </a:t>
-            </a:r>
-            <a:r>
-              <a:rPr b="0" lang="fr-FR" sz="1800" spc="-1" strike="noStrike">
-                <a:solidFill>
-                  <a:srgbClr val="000000"/>
-                </a:solidFill>
-                <a:uFill>
-                  <a:solidFill>
-                    <a:srgbClr val="ffffff"/>
-                  </a:solidFill>
-                </a:uFill>
-                <a:latin typeface="Arial"/>
-              </a:rPr>
-              <a:t>t</a:t>
-            </a:r>
-            <a:r>
-              <a:rPr b="0" lang="fr-FR" sz="1800" spc="-1" strike="noStrike">
-                <a:solidFill>
-                  <a:srgbClr val="000000"/>
-                </a:solidFill>
-                <a:uFill>
-                  <a:solidFill>
-                    <a:srgbClr val="ffffff"/>
-                  </a:solidFill>
-                </a:uFill>
-                <a:latin typeface="Arial"/>
-              </a:rPr>
-              <a:t>e</a:t>
-            </a:r>
-            <a:r>
-              <a:rPr b="0" lang="fr-FR" sz="1800" spc="-1" strike="noStrike">
-                <a:solidFill>
-                  <a:srgbClr val="000000"/>
-                </a:solidFill>
-                <a:uFill>
-                  <a:solidFill>
-                    <a:srgbClr val="ffffff"/>
-                  </a:solidFill>
-                </a:uFill>
-                <a:latin typeface="Arial"/>
-              </a:rPr>
-              <a:t>x</a:t>
-            </a:r>
-            <a:r>
-              <a:rPr b="0" lang="fr-FR" sz="1800" spc="-1" strike="noStrike">
-                <a:solidFill>
-                  <a:srgbClr val="000000"/>
-                </a:solidFill>
-                <a:uFill>
-                  <a:solidFill>
-                    <a:srgbClr val="ffffff"/>
-                  </a:solidFill>
-                </a:uFill>
-                <a:latin typeface="Arial"/>
-              </a:rPr>
-              <a:t>t</a:t>
-            </a:r>
-            <a:r>
-              <a:rPr b="0" lang="fr-FR" sz="1800" spc="-1" strike="noStrike">
-                <a:solidFill>
-                  <a:srgbClr val="000000"/>
-                </a:solidFill>
-                <a:uFill>
-                  <a:solidFill>
-                    <a:srgbClr val="ffffff"/>
-                  </a:solidFill>
-                </a:uFill>
-                <a:latin typeface="Arial"/>
-              </a:rPr>
-              <a:t>e</a:t>
-            </a:r>
-            <a:r>
-              <a:rPr b="0" lang="fr-FR" sz="1800" spc="-1" strike="noStrike">
-                <a:solidFill>
-                  <a:srgbClr val="000000"/>
-                </a:solidFill>
-                <a:uFill>
-                  <a:solidFill>
-                    <a:srgbClr val="ffffff"/>
-                  </a:solidFill>
-                </a:uFill>
-                <a:latin typeface="Arial"/>
-              </a:rPr>
-              <a:t>-</a:t>
-            </a:r>
-            <a:r>
-              <a:rPr b="0" lang="fr-FR" sz="1800" spc="-1" strike="noStrike">
-                <a:solidFill>
-                  <a:srgbClr val="000000"/>
-                </a:solidFill>
-                <a:uFill>
-                  <a:solidFill>
-                    <a:srgbClr val="ffffff"/>
-                  </a:solidFill>
-                </a:uFill>
-                <a:latin typeface="Arial"/>
-              </a:rPr>
-              <a:t>ti</a:t>
-            </a:r>
-            <a:r>
-              <a:rPr b="0" lang="fr-FR" sz="1800" spc="-1" strike="noStrike">
-                <a:solidFill>
-                  <a:srgbClr val="000000"/>
-                </a:solidFill>
-                <a:uFill>
-                  <a:solidFill>
-                    <a:srgbClr val="ffffff"/>
-                  </a:solidFill>
-                </a:uFill>
-                <a:latin typeface="Arial"/>
-              </a:rPr>
-              <a:t>tr</a:t>
-            </a:r>
-            <a:r>
-              <a:rPr b="0" lang="fr-FR" sz="1800" spc="-1" strike="noStrike">
-                <a:solidFill>
-                  <a:srgbClr val="000000"/>
-                </a:solidFill>
-                <a:uFill>
-                  <a:solidFill>
-                    <a:srgbClr val="ffffff"/>
-                  </a:solidFill>
-                </a:uFill>
-                <a:latin typeface="Arial"/>
-              </a:rPr>
-              <a:t>e</a:t>
-            </a:r>
-            <a:endParaRPr b="0" lang="fr-FR" sz="1800" spc="-1" strike="noStrike">
+            <a:endParaRPr b="0" lang="fr-FR" sz="4400" spc="-1" strike="noStrike">
               <a:solidFill>
                 <a:srgbClr val="000000"/>
               </a:solidFill>
@@ -4653,7 +3730,7 @@
         <p:spPr>
           <a:xfrm>
             <a:off x="457200" y="1604520"/>
-            <a:ext cx="8228880" cy="3976920"/>
+            <a:ext cx="8229240" cy="3977280"/>
           </a:xfrm>
           <a:prstGeom prst="rect">
             <a:avLst/>
@@ -4676,7 +3753,7 @@
               <a:buChar char=""/>
             </a:pPr>
             <a:r>
-              <a:rPr b="0" lang="fr-FR" sz="1800" spc="-1" strike="noStrike">
+              <a:rPr b="0" lang="fr-FR" sz="3200" spc="-1" strike="noStrike">
                 <a:solidFill>
                   <a:srgbClr val="000000"/>
                 </a:solidFill>
@@ -4689,7 +3766,7 @@
               </a:rPr>
               <a:t>Cliquez pour éditer le format du plan de texte</a:t>
             </a:r>
-            <a:endParaRPr b="0" lang="fr-FR" sz="1800" spc="-1" strike="noStrike">
+            <a:endParaRPr b="0" lang="fr-FR" sz="3200" spc="-1" strike="noStrike">
               <a:solidFill>
                 <a:srgbClr val="000000"/>
               </a:solidFill>
@@ -4714,7 +3791,7 @@
               <a:buChar char=""/>
             </a:pPr>
             <a:r>
-              <a:rPr b="0" lang="fr-FR" sz="1800" spc="-1" strike="noStrike">
+              <a:rPr b="0" lang="fr-FR" sz="2800" spc="-1" strike="noStrike">
                 <a:solidFill>
                   <a:srgbClr val="000000"/>
                 </a:solidFill>
@@ -4727,7 +3804,7 @@
               </a:rPr>
               <a:t>Second niveau de plan</a:t>
             </a:r>
-            <a:endParaRPr b="0" lang="fr-FR" sz="1800" spc="-1" strike="noStrike">
+            <a:endParaRPr b="0" lang="fr-FR" sz="2800" spc="-1" strike="noStrike">
               <a:solidFill>
                 <a:srgbClr val="000000"/>
               </a:solidFill>
@@ -4752,7 +3829,7 @@
               <a:buChar char=""/>
             </a:pPr>
             <a:r>
-              <a:rPr b="0" lang="fr-FR" sz="1800" spc="-1" strike="noStrike">
+              <a:rPr b="0" lang="fr-FR" sz="2400" spc="-1" strike="noStrike">
                 <a:solidFill>
                   <a:srgbClr val="000000"/>
                 </a:solidFill>
@@ -4765,7 +3842,7 @@
               </a:rPr>
               <a:t>Troisième niveau de plan</a:t>
             </a:r>
-            <a:endParaRPr b="0" lang="fr-FR" sz="1800" spc="-1" strike="noStrike">
+            <a:endParaRPr b="0" lang="fr-FR" sz="2400" spc="-1" strike="noStrike">
               <a:solidFill>
                 <a:srgbClr val="000000"/>
               </a:solidFill>
@@ -4790,7 +3867,7 @@
               <a:buChar char=""/>
             </a:pPr>
             <a:r>
-              <a:rPr b="0" lang="fr-FR" sz="1800" spc="-1" strike="noStrike">
+              <a:rPr b="0" lang="fr-FR" sz="2000" spc="-1" strike="noStrike">
                 <a:solidFill>
                   <a:srgbClr val="000000"/>
                 </a:solidFill>
@@ -4803,7 +3880,7 @@
               </a:rPr>
               <a:t>Quatrième niveau de plan</a:t>
             </a:r>
-            <a:endParaRPr b="0" lang="fr-FR" sz="1800" spc="-1" strike="noStrike">
+            <a:endParaRPr b="0" lang="fr-FR" sz="2000" spc="-1" strike="noStrike">
               <a:solidFill>
                 <a:srgbClr val="000000"/>
               </a:solidFill>
@@ -4828,7 +3905,7 @@
               <a:buChar char=""/>
             </a:pPr>
             <a:r>
-              <a:rPr b="0" lang="fr-FR" sz="1800" spc="-1" strike="noStrike">
+              <a:rPr b="0" lang="fr-FR" sz="2000" spc="-1" strike="noStrike">
                 <a:solidFill>
                   <a:srgbClr val="000000"/>
                 </a:solidFill>
@@ -4841,7 +3918,7 @@
               </a:rPr>
               <a:t>Cinquième niveau de plan</a:t>
             </a:r>
-            <a:endParaRPr b="0" lang="fr-FR" sz="1800" spc="-1" strike="noStrike">
+            <a:endParaRPr b="0" lang="fr-FR" sz="2000" spc="-1" strike="noStrike">
               <a:solidFill>
                 <a:srgbClr val="000000"/>
               </a:solidFill>
@@ -4866,7 +3943,7 @@
               <a:buChar char=""/>
             </a:pPr>
             <a:r>
-              <a:rPr b="0" lang="fr-FR" sz="1800" spc="-1" strike="noStrike">
+              <a:rPr b="0" lang="fr-FR" sz="2000" spc="-1" strike="noStrike">
                 <a:solidFill>
                   <a:srgbClr val="000000"/>
                 </a:solidFill>
@@ -4879,7 +3956,7 @@
               </a:rPr>
               <a:t>Sixième niveau de plan</a:t>
             </a:r>
-            <a:endParaRPr b="0" lang="fr-FR" sz="1800" spc="-1" strike="noStrike">
+            <a:endParaRPr b="0" lang="fr-FR" sz="2000" spc="-1" strike="noStrike">
               <a:solidFill>
                 <a:srgbClr val="000000"/>
               </a:solidFill>
@@ -4904,7 +3981,7 @@
               <a:buChar char=""/>
             </a:pPr>
             <a:r>
-              <a:rPr b="0" lang="fr-FR" sz="1800" spc="-1" strike="noStrike">
+              <a:rPr b="0" lang="fr-FR" sz="2000" spc="-1" strike="noStrike">
                 <a:solidFill>
                   <a:srgbClr val="000000"/>
                 </a:solidFill>
@@ -4917,7 +3994,7 @@
               </a:rPr>
               <a:t>Septième niveau de plan</a:t>
             </a:r>
-            <a:endParaRPr b="0" lang="fr-FR" sz="1800" spc="-1" strike="noStrike">
+            <a:endParaRPr b="0" lang="fr-FR" sz="2000" spc="-1" strike="noStrike">
               <a:solidFill>
                 <a:srgbClr val="000000"/>
               </a:solidFill>
@@ -4977,7 +4054,7 @@
         <p:spPr>
           <a:xfrm>
             <a:off x="1071720" y="1113480"/>
-            <a:ext cx="499320" cy="357840"/>
+            <a:ext cx="498960" cy="357480"/>
           </a:xfrm>
           <a:custGeom>
             <a:avLst/>
@@ -5025,8 +4102,8 @@
         </p:nvSpPr>
         <p:spPr>
           <a:xfrm flipV="1">
-            <a:off x="1071360" y="1471320"/>
-            <a:ext cx="499320" cy="354960"/>
+            <a:off x="1071360" y="1470600"/>
+            <a:ext cx="498960" cy="354600"/>
           </a:xfrm>
           <a:custGeom>
             <a:avLst/>
@@ -5075,7 +4152,7 @@
         <p:spPr>
           <a:xfrm>
             <a:off x="7360920" y="1465920"/>
-            <a:ext cx="496440" cy="3960"/>
+            <a:ext cx="496080" cy="3600"/>
           </a:xfrm>
           <a:custGeom>
             <a:avLst/>
@@ -5124,7 +4201,7 @@
         <p:spPr>
           <a:xfrm>
             <a:off x="4929120" y="2393280"/>
-            <a:ext cx="285120" cy="720"/>
+            <a:ext cx="284760" cy="360"/>
           </a:xfrm>
           <a:custGeom>
             <a:avLst/>
@@ -5173,7 +4250,7 @@
         <p:spPr>
           <a:xfrm>
             <a:off x="3500280" y="2071800"/>
-            <a:ext cx="1428120" cy="642240"/>
+            <a:ext cx="1427760" cy="641880"/>
           </a:xfrm>
           <a:prstGeom prst="rect">
             <a:avLst/>
@@ -5241,8 +4318,8 @@
         </p:nvSpPr>
         <p:spPr>
           <a:xfrm flipH="1" rot="16200000">
-            <a:off x="1647360" y="1756080"/>
-            <a:ext cx="740520" cy="533520"/>
+            <a:off x="1646640" y="1756440"/>
+            <a:ext cx="740160" cy="533160"/>
           </a:xfrm>
           <a:custGeom>
             <a:avLst/>
@@ -5291,7 +4368,7 @@
         <p:spPr>
           <a:xfrm>
             <a:off x="142920" y="1643040"/>
-            <a:ext cx="928080" cy="364320"/>
+            <a:ext cx="927720" cy="363960"/>
           </a:xfrm>
           <a:prstGeom prst="rect">
             <a:avLst/>
@@ -5355,7 +4432,7 @@
         <p:spPr>
           <a:xfrm>
             <a:off x="142920" y="928800"/>
-            <a:ext cx="928080" cy="364320"/>
+            <a:ext cx="927720" cy="363960"/>
           </a:xfrm>
           <a:prstGeom prst="rect">
             <a:avLst/>
@@ -5419,7 +4496,7 @@
         <p:spPr>
           <a:xfrm>
             <a:off x="1571760" y="1292040"/>
-            <a:ext cx="359280" cy="359280"/>
+            <a:ext cx="358920" cy="358920"/>
           </a:xfrm>
           <a:prstGeom prst="ellipse">
             <a:avLst/>
@@ -5488,7 +4565,7 @@
         <p:spPr>
           <a:xfrm flipV="1">
             <a:off x="1931760" y="1463760"/>
-            <a:ext cx="3282480" cy="6840"/>
+            <a:ext cx="3282120" cy="6480"/>
           </a:xfrm>
           <a:custGeom>
             <a:avLst/>
@@ -5537,7 +4614,7 @@
         <p:spPr>
           <a:xfrm>
             <a:off x="2286000" y="2071800"/>
-            <a:ext cx="928080" cy="642240"/>
+            <a:ext cx="927720" cy="641880"/>
           </a:xfrm>
           <a:prstGeom prst="rect">
             <a:avLst/>
@@ -5606,7 +4683,7 @@
         <p:spPr>
           <a:xfrm>
             <a:off x="3214800" y="2393280"/>
-            <a:ext cx="285120" cy="720"/>
+            <a:ext cx="284760" cy="360"/>
           </a:xfrm>
           <a:custGeom>
             <a:avLst/>
@@ -5654,8 +4731,8 @@
         </p:nvSpPr>
         <p:spPr>
           <a:xfrm flipV="1">
-            <a:off x="1931760" y="606600"/>
-            <a:ext cx="568080" cy="864000"/>
+            <a:off x="1931760" y="605880"/>
+            <a:ext cx="567720" cy="863640"/>
           </a:xfrm>
           <a:custGeom>
             <a:avLst/>
@@ -5704,7 +4781,7 @@
         <p:spPr>
           <a:xfrm>
             <a:off x="2500200" y="285840"/>
-            <a:ext cx="1142280" cy="642240"/>
+            <a:ext cx="1141920" cy="641880"/>
           </a:xfrm>
           <a:prstGeom prst="rect">
             <a:avLst/>
@@ -5773,7 +4850,7 @@
         <p:spPr>
           <a:xfrm>
             <a:off x="3929040" y="285840"/>
-            <a:ext cx="928080" cy="642240"/>
+            <a:ext cx="927720" cy="641880"/>
           </a:xfrm>
           <a:prstGeom prst="rect">
             <a:avLst/>
@@ -5842,7 +4919,7 @@
         <p:spPr>
           <a:xfrm>
             <a:off x="3643200" y="607320"/>
-            <a:ext cx="285120" cy="720"/>
+            <a:ext cx="284760" cy="360"/>
           </a:xfrm>
           <a:custGeom>
             <a:avLst/>
@@ -5891,7 +4968,7 @@
         <p:spPr>
           <a:xfrm>
             <a:off x="5214960" y="285840"/>
-            <a:ext cx="928080" cy="642240"/>
+            <a:ext cx="927720" cy="641880"/>
           </a:xfrm>
           <a:prstGeom prst="rect">
             <a:avLst/>
@@ -5960,7 +5037,7 @@
         <p:spPr>
           <a:xfrm>
             <a:off x="5214960" y="2071800"/>
-            <a:ext cx="928080" cy="642240"/>
+            <a:ext cx="927720" cy="641880"/>
           </a:xfrm>
           <a:prstGeom prst="rect">
             <a:avLst/>
@@ -6029,7 +5106,7 @@
         <p:spPr>
           <a:xfrm>
             <a:off x="4857840" y="607320"/>
-            <a:ext cx="356400" cy="720"/>
+            <a:ext cx="356040" cy="360"/>
           </a:xfrm>
           <a:custGeom>
             <a:avLst/>
@@ -6078,7 +5155,7 @@
         <p:spPr>
           <a:xfrm>
             <a:off x="5214960" y="1143000"/>
-            <a:ext cx="928080" cy="642240"/>
+            <a:ext cx="927720" cy="641880"/>
           </a:xfrm>
           <a:prstGeom prst="rect">
             <a:avLst/>
@@ -6147,7 +5224,7 @@
         <p:spPr>
           <a:xfrm>
             <a:off x="7000920" y="1285920"/>
-            <a:ext cx="359280" cy="359280"/>
+            <a:ext cx="358920" cy="358920"/>
           </a:xfrm>
           <a:prstGeom prst="ellipse">
             <a:avLst/>
@@ -6216,7 +5293,7 @@
         <p:spPr>
           <a:xfrm>
             <a:off x="6143760" y="607320"/>
-            <a:ext cx="909360" cy="730800"/>
+            <a:ext cx="909000" cy="730440"/>
           </a:xfrm>
           <a:custGeom>
             <a:avLst/>
@@ -6265,7 +5342,7 @@
         <p:spPr>
           <a:xfrm>
             <a:off x="6143760" y="1464480"/>
-            <a:ext cx="856440" cy="720"/>
+            <a:ext cx="856080" cy="360"/>
           </a:xfrm>
           <a:custGeom>
             <a:avLst/>
@@ -6313,8 +5390,8 @@
         </p:nvSpPr>
         <p:spPr>
           <a:xfrm flipV="1">
-            <a:off x="6143760" y="1592280"/>
-            <a:ext cx="909360" cy="799200"/>
+            <a:off x="6143760" y="1591560"/>
+            <a:ext cx="909000" cy="798840"/>
           </a:xfrm>
           <a:custGeom>
             <a:avLst/>
@@ -6363,7 +5440,7 @@
         <p:spPr>
           <a:xfrm>
             <a:off x="1357200" y="142920"/>
-            <a:ext cx="6214320" cy="2714040"/>
+            <a:ext cx="6213960" cy="2713680"/>
           </a:xfrm>
           <a:prstGeom prst="rect">
             <a:avLst/>
@@ -6400,7 +5477,7 @@
         <p:spPr>
           <a:xfrm>
             <a:off x="6429240" y="2500200"/>
-            <a:ext cx="1142280" cy="364320"/>
+            <a:ext cx="1141920" cy="363960"/>
           </a:xfrm>
           <a:prstGeom prst="rect">
             <a:avLst/>
@@ -6462,7 +5539,7 @@
         <p:spPr>
           <a:xfrm>
             <a:off x="7858080" y="1285920"/>
-            <a:ext cx="928080" cy="364320"/>
+            <a:ext cx="927720" cy="363960"/>
           </a:xfrm>
           <a:prstGeom prst="rect">
             <a:avLst/>
@@ -6575,7 +5652,7 @@
         <p:spPr>
           <a:xfrm>
             <a:off x="3921480" y="574200"/>
-            <a:ext cx="1001160" cy="638640"/>
+            <a:ext cx="1000800" cy="638280"/>
           </a:xfrm>
           <a:prstGeom prst="rect">
             <a:avLst/>
@@ -6639,7 +5716,7 @@
         <p:spPr>
           <a:xfrm>
             <a:off x="3929040" y="71280"/>
-            <a:ext cx="999360" cy="364320"/>
+            <a:ext cx="999000" cy="363960"/>
           </a:xfrm>
           <a:prstGeom prst="rect">
             <a:avLst/>
@@ -6703,7 +5780,7 @@
         <p:spPr>
           <a:xfrm>
             <a:off x="5286240" y="258120"/>
-            <a:ext cx="713520" cy="642240"/>
+            <a:ext cx="713160" cy="641880"/>
           </a:xfrm>
           <a:prstGeom prst="rect">
             <a:avLst/>
@@ -6772,7 +5849,7 @@
         <p:spPr>
           <a:xfrm>
             <a:off x="4929120" y="255960"/>
-            <a:ext cx="356400" cy="322920"/>
+            <a:ext cx="356040" cy="322560"/>
           </a:xfrm>
           <a:custGeom>
             <a:avLst/>
@@ -6820,8 +5897,8 @@
         </p:nvSpPr>
         <p:spPr>
           <a:xfrm flipV="1">
-            <a:off x="4923360" y="578880"/>
-            <a:ext cx="362160" cy="316800"/>
+            <a:off x="4923360" y="578160"/>
+            <a:ext cx="361800" cy="316440"/>
           </a:xfrm>
           <a:custGeom>
             <a:avLst/>
@@ -6869,8 +5946,8 @@
         </p:nvSpPr>
         <p:spPr>
           <a:xfrm flipV="1">
-            <a:off x="6000840" y="577440"/>
-            <a:ext cx="285120" cy="360"/>
+            <a:off x="6000840" y="576720"/>
+            <a:ext cx="284760" cy="360"/>
           </a:xfrm>
           <a:custGeom>
             <a:avLst/>
@@ -6919,7 +5996,7 @@
         <p:spPr>
           <a:xfrm>
             <a:off x="6286680" y="394200"/>
-            <a:ext cx="2142360" cy="364320"/>
+            <a:ext cx="2142000" cy="363960"/>
           </a:xfrm>
           <a:prstGeom prst="rect">
             <a:avLst/>
@@ -6983,7 +6060,7 @@
         <p:spPr>
           <a:xfrm>
             <a:off x="928800" y="393840"/>
-            <a:ext cx="1499400" cy="364320"/>
+            <a:ext cx="1499040" cy="363960"/>
           </a:xfrm>
           <a:prstGeom prst="rect">
             <a:avLst/>
@@ -7047,7 +6124,7 @@
         <p:spPr>
           <a:xfrm>
             <a:off x="928800" y="893880"/>
-            <a:ext cx="1499400" cy="638640"/>
+            <a:ext cx="1499040" cy="638280"/>
           </a:xfrm>
           <a:prstGeom prst="rect">
             <a:avLst/>
@@ -7144,7 +6221,7 @@
         <p:spPr>
           <a:xfrm>
             <a:off x="2857320" y="571320"/>
-            <a:ext cx="713520" cy="642240"/>
+            <a:ext cx="713160" cy="641880"/>
           </a:xfrm>
           <a:prstGeom prst="rect">
             <a:avLst/>
@@ -7213,7 +6290,7 @@
         <p:spPr>
           <a:xfrm>
             <a:off x="2428920" y="578520"/>
-            <a:ext cx="428040" cy="313920"/>
+            <a:ext cx="427680" cy="313560"/>
           </a:xfrm>
           <a:custGeom>
             <a:avLst/>
@@ -7261,8 +6338,8 @@
         </p:nvSpPr>
         <p:spPr>
           <a:xfrm flipV="1">
-            <a:off x="2428920" y="892080"/>
-            <a:ext cx="428040" cy="323280"/>
+            <a:off x="2428920" y="891360"/>
+            <a:ext cx="427680" cy="322920"/>
           </a:xfrm>
           <a:custGeom>
             <a:avLst/>
@@ -7311,7 +6388,7 @@
         <p:spPr>
           <a:xfrm>
             <a:off x="3571920" y="892800"/>
-            <a:ext cx="349200" cy="3600"/>
+            <a:ext cx="348840" cy="3240"/>
           </a:xfrm>
           <a:custGeom>
             <a:avLst/>
@@ -7400,39 +6477,490 @@
           <a:chExt cx="0" cy="0"/>
         </a:xfrm>
       </p:grpSpPr>
-      <p:pic>
-        <p:nvPicPr>
-          <p:cNvPr id="116" name="" descr=""/>
-          <p:cNvPicPr/>
+      <p:sp>
+        <p:nvSpPr>
+          <p:cNvPr id="116" name="CustomShape 1"/>
+          <p:cNvSpPr/>
           <p:nvPr/>
-        </p:nvPicPr>
-        <p:blipFill>
-          <a:blip r:embed="rId1"/>
-          <a:stretch/>
-        </p:blipFill>
-        <p:spPr>
-          <a:xfrm>
-            <a:off x="1320120" y="1333800"/>
-            <a:ext cx="2460960" cy="2683080"/>
-          </a:xfrm>
-          <a:prstGeom prst="rect">
-            <a:avLst/>
-          </a:prstGeom>
+        </p:nvSpPr>
+        <p:spPr>
+          <a:xfrm rot="18910800">
+            <a:off x="3742560" y="2697840"/>
+            <a:ext cx="359280" cy="359280"/>
+          </a:xfrm>
+          <a:prstGeom prst="ellipse">
+            <a:avLst/>
+          </a:prstGeom>
+          <a:solidFill>
+            <a:srgbClr val="729fcf"/>
+          </a:solidFill>
+          <a:ln>
+            <a:solidFill>
+              <a:srgbClr val="3465a4"/>
+            </a:solidFill>
+          </a:ln>
+        </p:spPr>
+        <p:style>
+          <a:lnRef idx="0"/>
+          <a:fillRef idx="0"/>
+          <a:effectRef idx="0"/>
+          <a:fontRef idx="minor"/>
+        </p:style>
+      </p:sp>
+      <p:sp>
+        <p:nvSpPr>
+          <p:cNvPr id="117" name="CustomShape 2"/>
+          <p:cNvSpPr/>
+          <p:nvPr/>
+        </p:nvSpPr>
+        <p:spPr>
+          <a:xfrm rot="18910800">
+            <a:off x="2466360" y="3966480"/>
+            <a:ext cx="359280" cy="359280"/>
+          </a:xfrm>
+          <a:prstGeom prst="ellipse">
+            <a:avLst/>
+          </a:prstGeom>
+          <a:solidFill>
+            <a:srgbClr val="729fcf"/>
+          </a:solidFill>
+          <a:ln>
+            <a:solidFill>
+              <a:srgbClr val="3465a4"/>
+            </a:solidFill>
+          </a:ln>
+        </p:spPr>
+        <p:style>
+          <a:lnRef idx="0"/>
+          <a:fillRef idx="0"/>
+          <a:effectRef idx="0"/>
+          <a:fontRef idx="minor"/>
+        </p:style>
+      </p:sp>
+      <p:sp>
+        <p:nvSpPr>
+          <p:cNvPr id="118" name="CustomShape 3"/>
+          <p:cNvSpPr/>
+          <p:nvPr/>
+        </p:nvSpPr>
+        <p:spPr>
+          <a:xfrm rot="18910800">
+            <a:off x="2473200" y="1420920"/>
+            <a:ext cx="359280" cy="359280"/>
+          </a:xfrm>
+          <a:prstGeom prst="ellipse">
+            <a:avLst/>
+          </a:prstGeom>
+          <a:solidFill>
+            <a:srgbClr val="729fcf"/>
+          </a:solidFill>
+          <a:ln>
+            <a:solidFill>
+              <a:srgbClr val="3465a4"/>
+            </a:solidFill>
+          </a:ln>
+        </p:spPr>
+        <p:style>
+          <a:lnRef idx="0"/>
+          <a:fillRef idx="0"/>
+          <a:effectRef idx="0"/>
+          <a:fontRef idx="minor"/>
+        </p:style>
+      </p:sp>
+      <p:sp>
+        <p:nvSpPr>
+          <p:cNvPr id="119" name="CustomShape 4"/>
+          <p:cNvSpPr/>
+          <p:nvPr/>
+        </p:nvSpPr>
+        <p:spPr>
+          <a:xfrm rot="18910800">
+            <a:off x="1195920" y="2689920"/>
+            <a:ext cx="359280" cy="359280"/>
+          </a:xfrm>
+          <a:prstGeom prst="ellipse">
+            <a:avLst/>
+          </a:prstGeom>
+          <a:solidFill>
+            <a:srgbClr val="729fcf"/>
+          </a:solidFill>
+          <a:ln>
+            <a:solidFill>
+              <a:srgbClr val="3465a4"/>
+            </a:solidFill>
+          </a:ln>
+        </p:spPr>
+        <p:style>
+          <a:lnRef idx="0"/>
+          <a:fillRef idx="0"/>
+          <a:effectRef idx="0"/>
+          <a:fontRef idx="minor"/>
+        </p:style>
+      </p:sp>
+      <p:sp>
+        <p:nvSpPr>
+          <p:cNvPr id="120" name="Line 5"/>
+          <p:cNvSpPr/>
+          <p:nvPr/>
+        </p:nvSpPr>
+        <p:spPr>
+          <a:xfrm>
+            <a:off x="1376640" y="2869920"/>
+            <a:ext cx="2545920" cy="7920"/>
+          </a:xfrm>
+          <a:prstGeom prst="line">
+            <a:avLst/>
+          </a:prstGeom>
+          <a:ln>
+            <a:solidFill>
+              <a:srgbClr val="000000"/>
+            </a:solidFill>
+          </a:ln>
+        </p:spPr>
+        <p:style>
+          <a:lnRef idx="0"/>
+          <a:fillRef idx="0"/>
+          <a:effectRef idx="0"/>
+          <a:fontRef idx="minor"/>
+        </p:style>
+      </p:sp>
+      <p:sp>
+        <p:nvSpPr>
+          <p:cNvPr id="121" name="Line 6"/>
+          <p:cNvSpPr/>
+          <p:nvPr/>
+        </p:nvSpPr>
+        <p:spPr>
+          <a:xfrm flipV="1">
+            <a:off x="2645280" y="1601280"/>
+            <a:ext cx="8280" cy="2545560"/>
+          </a:xfrm>
+          <a:prstGeom prst="line">
+            <a:avLst/>
+          </a:prstGeom>
+          <a:ln>
+            <a:solidFill>
+              <a:srgbClr val="000000"/>
+            </a:solidFill>
+          </a:ln>
+        </p:spPr>
+        <p:style>
+          <a:lnRef idx="0"/>
+          <a:fillRef idx="0"/>
+          <a:effectRef idx="0"/>
+          <a:fontRef idx="minor"/>
+        </p:style>
+      </p:sp>
+      <p:sp>
+        <p:nvSpPr>
+          <p:cNvPr id="122" name="CustomShape 7"/>
+          <p:cNvSpPr/>
+          <p:nvPr/>
+        </p:nvSpPr>
+        <p:spPr>
+          <a:xfrm>
+            <a:off x="891000" y="3024000"/>
+            <a:ext cx="332280" cy="342720"/>
+          </a:xfrm>
+          <a:prstGeom prst="rect">
+            <a:avLst/>
+          </a:prstGeom>
+          <a:noFill/>
           <a:ln>
             <a:noFill/>
           </a:ln>
         </p:spPr>
-      </p:pic>
-      <p:sp>
-        <p:nvSpPr>
-          <p:cNvPr id="117" name="Line 1"/>
+        <p:style>
+          <a:lnRef idx="0"/>
+          <a:fillRef idx="0"/>
+          <a:effectRef idx="0"/>
+          <a:fontRef idx="minor"/>
+        </p:style>
+        <p:txBody>
+          <a:bodyPr lIns="90000" rIns="90000" tIns="45000" bIns="45000"/>
+          <a:p>
+            <a:r>
+              <a:rPr b="0" lang="fr-FR" sz="1800" spc="-1" strike="noStrike">
+                <a:solidFill>
+                  <a:srgbClr val="000000"/>
+                </a:solidFill>
+                <a:uFill>
+                  <a:solidFill>
+                    <a:srgbClr val="ffffff"/>
+                  </a:solidFill>
+                </a:uFill>
+                <a:latin typeface="Arial"/>
+                <a:ea typeface="DejaVu Sans"/>
+              </a:rPr>
+              <a:t>A</a:t>
+            </a:r>
+            <a:endParaRPr b="0" lang="fr-FR" sz="1800" spc="-1" strike="noStrike">
+              <a:solidFill>
+                <a:srgbClr val="000000"/>
+              </a:solidFill>
+              <a:uFill>
+                <a:solidFill>
+                  <a:srgbClr val="ffffff"/>
+                </a:solidFill>
+              </a:uFill>
+              <a:latin typeface="Arial"/>
+            </a:endParaRPr>
+          </a:p>
+        </p:txBody>
+      </p:sp>
+      <p:sp>
+        <p:nvSpPr>
+          <p:cNvPr id="123" name="CustomShape 8"/>
           <p:cNvSpPr/>
           <p:nvPr/>
         </p:nvSpPr>
         <p:spPr>
+          <a:xfrm>
+            <a:off x="2115000" y="4248000"/>
+            <a:ext cx="332280" cy="342720"/>
+          </a:xfrm>
+          <a:prstGeom prst="rect">
+            <a:avLst/>
+          </a:prstGeom>
+          <a:noFill/>
+          <a:ln>
+            <a:noFill/>
+          </a:ln>
+        </p:spPr>
+        <p:style>
+          <a:lnRef idx="0"/>
+          <a:fillRef idx="0"/>
+          <a:effectRef idx="0"/>
+          <a:fontRef idx="minor"/>
+        </p:style>
+        <p:txBody>
+          <a:bodyPr lIns="90000" rIns="90000" tIns="45000" bIns="45000"/>
+          <a:p>
+            <a:r>
+              <a:rPr b="0" lang="fr-FR" sz="1800" spc="-1" strike="noStrike">
+                <a:solidFill>
+                  <a:srgbClr val="000000"/>
+                </a:solidFill>
+                <a:uFill>
+                  <a:solidFill>
+                    <a:srgbClr val="ffffff"/>
+                  </a:solidFill>
+                </a:uFill>
+                <a:latin typeface="Arial"/>
+                <a:ea typeface="DejaVu Sans"/>
+              </a:rPr>
+              <a:t>B</a:t>
+            </a:r>
+            <a:endParaRPr b="0" lang="fr-FR" sz="1800" spc="-1" strike="noStrike">
+              <a:solidFill>
+                <a:srgbClr val="000000"/>
+              </a:solidFill>
+              <a:uFill>
+                <a:solidFill>
+                  <a:srgbClr val="ffffff"/>
+                </a:solidFill>
+              </a:uFill>
+              <a:latin typeface="Arial"/>
+            </a:endParaRPr>
+          </a:p>
+        </p:txBody>
+      </p:sp>
+      <p:sp>
+        <p:nvSpPr>
+          <p:cNvPr id="124" name="CustomShape 9"/>
+          <p:cNvSpPr/>
+          <p:nvPr/>
+        </p:nvSpPr>
+        <p:spPr>
+          <a:xfrm>
+            <a:off x="3398760" y="3024000"/>
+            <a:ext cx="344520" cy="342720"/>
+          </a:xfrm>
+          <a:prstGeom prst="rect">
+            <a:avLst/>
+          </a:prstGeom>
+          <a:noFill/>
+          <a:ln>
+            <a:noFill/>
+          </a:ln>
+        </p:spPr>
+        <p:style>
+          <a:lnRef idx="0"/>
+          <a:fillRef idx="0"/>
+          <a:effectRef idx="0"/>
+          <a:fontRef idx="minor"/>
+        </p:style>
+        <p:txBody>
+          <a:bodyPr lIns="90000" rIns="90000" tIns="45000" bIns="45000"/>
+          <a:p>
+            <a:r>
+              <a:rPr b="0" lang="fr-FR" sz="1800" spc="-1" strike="noStrike">
+                <a:solidFill>
+                  <a:srgbClr val="000000"/>
+                </a:solidFill>
+                <a:uFill>
+                  <a:solidFill>
+                    <a:srgbClr val="ffffff"/>
+                  </a:solidFill>
+                </a:uFill>
+                <a:latin typeface="Arial"/>
+                <a:ea typeface="DejaVu Sans"/>
+              </a:rPr>
+              <a:t>C</a:t>
+            </a:r>
+            <a:endParaRPr b="0" lang="fr-FR" sz="1800" spc="-1" strike="noStrike">
+              <a:solidFill>
+                <a:srgbClr val="000000"/>
+              </a:solidFill>
+              <a:uFill>
+                <a:solidFill>
+                  <a:srgbClr val="ffffff"/>
+                </a:solidFill>
+              </a:uFill>
+              <a:latin typeface="Arial"/>
+            </a:endParaRPr>
+          </a:p>
+        </p:txBody>
+      </p:sp>
+      <p:sp>
+        <p:nvSpPr>
+          <p:cNvPr id="125" name="CustomShape 10"/>
+          <p:cNvSpPr/>
+          <p:nvPr/>
+        </p:nvSpPr>
+        <p:spPr>
+          <a:xfrm>
+            <a:off x="2822760" y="1152000"/>
+            <a:ext cx="344520" cy="342720"/>
+          </a:xfrm>
+          <a:prstGeom prst="rect">
+            <a:avLst/>
+          </a:prstGeom>
+          <a:noFill/>
+          <a:ln>
+            <a:noFill/>
+          </a:ln>
+        </p:spPr>
+        <p:style>
+          <a:lnRef idx="0"/>
+          <a:fillRef idx="0"/>
+          <a:effectRef idx="0"/>
+          <a:fontRef idx="minor"/>
+        </p:style>
+        <p:txBody>
+          <a:bodyPr lIns="90000" rIns="90000" tIns="45000" bIns="45000"/>
+          <a:p>
+            <a:r>
+              <a:rPr b="0" lang="fr-FR" sz="1800" spc="-1" strike="noStrike">
+                <a:solidFill>
+                  <a:srgbClr val="000000"/>
+                </a:solidFill>
+                <a:uFill>
+                  <a:solidFill>
+                    <a:srgbClr val="ffffff"/>
+                  </a:solidFill>
+                </a:uFill>
+                <a:latin typeface="Arial"/>
+                <a:ea typeface="DejaVu Sans"/>
+              </a:rPr>
+              <a:t>D</a:t>
+            </a:r>
+            <a:endParaRPr b="0" lang="fr-FR" sz="1800" spc="-1" strike="noStrike">
+              <a:solidFill>
+                <a:srgbClr val="000000"/>
+              </a:solidFill>
+              <a:uFill>
+                <a:solidFill>
+                  <a:srgbClr val="ffffff"/>
+                </a:solidFill>
+              </a:uFill>
+              <a:latin typeface="Arial"/>
+            </a:endParaRPr>
+          </a:p>
+        </p:txBody>
+      </p:sp>
+      <p:sp>
+        <p:nvSpPr>
+          <p:cNvPr id="126" name="CustomShape 11"/>
+          <p:cNvSpPr/>
+          <p:nvPr/>
+        </p:nvSpPr>
+        <p:spPr>
+          <a:xfrm>
+            <a:off x="1932120" y="2485800"/>
+            <a:ext cx="515880" cy="342720"/>
+          </a:xfrm>
+          <a:prstGeom prst="rect">
+            <a:avLst/>
+          </a:prstGeom>
+          <a:noFill/>
+          <a:ln>
+            <a:noFill/>
+          </a:ln>
+        </p:spPr>
+        <p:style>
+          <a:lnRef idx="0"/>
+          <a:fillRef idx="0"/>
+          <a:effectRef idx="0"/>
+          <a:fontRef idx="minor"/>
+        </p:style>
+        <p:txBody>
+          <a:bodyPr lIns="90000" rIns="90000" tIns="45000" bIns="45000"/>
+          <a:p>
+            <a:r>
+              <a:rPr b="0" lang="fr-FR" sz="1800" spc="-1" strike="noStrike">
+                <a:solidFill>
+                  <a:srgbClr val="000000"/>
+                </a:solidFill>
+                <a:uFill>
+                  <a:solidFill>
+                    <a:srgbClr val="ffffff"/>
+                  </a:solidFill>
+                </a:uFill>
+                <a:latin typeface="Arial"/>
+                <a:ea typeface="DejaVu Sans"/>
+              </a:rPr>
+              <a:t>R</a:t>
+            </a:r>
+            <a:r>
+              <a:rPr b="0" lang="fr-FR" sz="1800" spc="-1" strike="noStrike" baseline="-33000">
+                <a:solidFill>
+                  <a:srgbClr val="000000"/>
+                </a:solidFill>
+                <a:uFill>
+                  <a:solidFill>
+                    <a:srgbClr val="ffffff"/>
+                  </a:solidFill>
+                </a:uFill>
+                <a:latin typeface="Arial"/>
+                <a:ea typeface="DejaVu Sans"/>
+              </a:rPr>
+              <a:t>A</a:t>
+            </a:r>
+            <a:endParaRPr b="0" lang="fr-FR" sz="1800" spc="-1" strike="noStrike">
+              <a:solidFill>
+                <a:srgbClr val="000000"/>
+              </a:solidFill>
+              <a:uFill>
+                <a:solidFill>
+                  <a:srgbClr val="ffffff"/>
+                </a:solidFill>
+              </a:uFill>
+              <a:latin typeface="Arial"/>
+            </a:endParaRPr>
+          </a:p>
+        </p:txBody>
+      </p:sp>
+      <p:sp>
+        <p:nvSpPr>
+          <p:cNvPr id="127" name="Line 12"/>
+          <p:cNvSpPr/>
+          <p:nvPr/>
+        </p:nvSpPr>
+        <p:spPr>
           <a:xfrm flipV="1">
-            <a:off x="4392000" y="3708000"/>
-            <a:ext cx="0" cy="900000"/>
+            <a:off x="4176000" y="3636000"/>
+            <a:ext cx="360" cy="900000"/>
           </a:xfrm>
           <a:prstGeom prst="line">
             <a:avLst/>
@@ -7453,14 +6981,14 @@
       </p:sp>
       <p:sp>
         <p:nvSpPr>
-          <p:cNvPr id="118" name="Line 2"/>
+          <p:cNvPr id="128" name="Line 13"/>
           <p:cNvSpPr/>
           <p:nvPr/>
         </p:nvSpPr>
         <p:spPr>
           <a:xfrm flipH="1">
-            <a:off x="3492000" y="4608000"/>
-            <a:ext cx="900000" cy="0"/>
+            <a:off x="3276000" y="4536000"/>
+            <a:ext cx="900000" cy="360"/>
           </a:xfrm>
           <a:prstGeom prst="line">
             <a:avLst/>
@@ -7481,14 +7009,14 @@
       </p:sp>
       <p:sp>
         <p:nvSpPr>
-          <p:cNvPr id="119" name="TextShape 3"/>
-          <p:cNvSpPr txBox="1"/>
+          <p:cNvPr id="129" name="CustomShape 14"/>
+          <p:cNvSpPr/>
           <p:nvPr/>
         </p:nvSpPr>
         <p:spPr>
           <a:xfrm>
-            <a:off x="3312000" y="4572000"/>
-            <a:ext cx="432000" cy="343440"/>
+            <a:off x="3096000" y="4500000"/>
+            <a:ext cx="431640" cy="343080"/>
           </a:xfrm>
           <a:prstGeom prst="rect">
             <a:avLst/>
@@ -7498,6 +7026,12 @@
             <a:noFill/>
           </a:ln>
         </p:spPr>
+        <p:style>
+          <a:lnRef idx="0"/>
+          <a:fillRef idx="0"/>
+          <a:effectRef idx="0"/>
+          <a:fontRef idx="minor"/>
+        </p:style>
         <p:txBody>
           <a:bodyPr lIns="90000" rIns="90000" tIns="45000" bIns="45000"/>
           <a:p>
@@ -7531,14 +7065,14 @@
       </p:sp>
       <p:sp>
         <p:nvSpPr>
-          <p:cNvPr id="120" name="TextShape 4"/>
-          <p:cNvSpPr txBox="1"/>
+          <p:cNvPr id="130" name="CustomShape 15"/>
+          <p:cNvSpPr/>
           <p:nvPr/>
         </p:nvSpPr>
         <p:spPr>
           <a:xfrm>
-            <a:off x="4068000" y="3544560"/>
-            <a:ext cx="432000" cy="343440"/>
+            <a:off x="3852000" y="3544560"/>
+            <a:ext cx="431640" cy="343080"/>
           </a:xfrm>
           <a:prstGeom prst="rect">
             <a:avLst/>
@@ -7548,6 +7082,12 @@
             <a:noFill/>
           </a:ln>
         </p:spPr>
+        <p:style>
+          <a:lnRef idx="0"/>
+          <a:fillRef idx="0"/>
+          <a:effectRef idx="0"/>
+          <a:fontRef idx="minor"/>
+        </p:style>
         <p:txBody>
           <a:bodyPr lIns="90000" rIns="90000" tIns="45000" bIns="45000"/>
           <a:p>
@@ -7564,6 +7104,135 @@
                 <a:latin typeface="Arial"/>
               </a:rPr>
               <a:t>y</a:t>
+            </a:r>
+            <a:endParaRPr b="0" lang="fr-FR" sz="1800" spc="-1" strike="noStrike">
+              <a:solidFill>
+                <a:srgbClr val="000000"/>
+              </a:solidFill>
+              <a:uFill>
+                <a:solidFill>
+                  <a:srgbClr val="ffffff"/>
+                </a:solidFill>
+              </a:uFill>
+              <a:latin typeface="Arial"/>
+            </a:endParaRPr>
+          </a:p>
+        </p:txBody>
+      </p:sp>
+      <p:sp>
+        <p:nvSpPr>
+          <p:cNvPr id="131" name="CustomShape 16"/>
+          <p:cNvSpPr/>
+          <p:nvPr/>
+        </p:nvSpPr>
+        <p:spPr>
+          <a:xfrm>
+            <a:off x="2616120" y="3281040"/>
+            <a:ext cx="515880" cy="342720"/>
+          </a:xfrm>
+          <a:prstGeom prst="rect">
+            <a:avLst/>
+          </a:prstGeom>
+          <a:noFill/>
+          <a:ln>
+            <a:noFill/>
+          </a:ln>
+        </p:spPr>
+        <p:style>
+          <a:lnRef idx="0"/>
+          <a:fillRef idx="0"/>
+          <a:effectRef idx="0"/>
+          <a:fontRef idx="minor"/>
+        </p:style>
+        <p:txBody>
+          <a:bodyPr lIns="90000" rIns="90000" tIns="45000" bIns="45000"/>
+          <a:p>
+            <a:r>
+              <a:rPr b="0" lang="fr-FR" sz="1800" spc="-1" strike="noStrike">
+                <a:solidFill>
+                  <a:srgbClr val="000000"/>
+                </a:solidFill>
+                <a:uFill>
+                  <a:solidFill>
+                    <a:srgbClr val="ffffff"/>
+                  </a:solidFill>
+                </a:uFill>
+                <a:latin typeface="Arial"/>
+                <a:ea typeface="DejaVu Sans"/>
+              </a:rPr>
+              <a:t>R</a:t>
+            </a:r>
+            <a:r>
+              <a:rPr b="0" lang="fr-FR" sz="1800" spc="-1" strike="noStrike" baseline="-33000">
+                <a:solidFill>
+                  <a:srgbClr val="000000"/>
+                </a:solidFill>
+                <a:uFill>
+                  <a:solidFill>
+                    <a:srgbClr val="ffffff"/>
+                  </a:solidFill>
+                </a:uFill>
+                <a:latin typeface="Arial"/>
+                <a:ea typeface="DejaVu Sans"/>
+              </a:rPr>
+              <a:t>B</a:t>
+            </a:r>
+            <a:endParaRPr b="0" lang="fr-FR" sz="1800" spc="-1" strike="noStrike">
+              <a:solidFill>
+                <a:srgbClr val="000000"/>
+              </a:solidFill>
+              <a:uFill>
+                <a:solidFill>
+                  <a:srgbClr val="ffffff"/>
+                </a:solidFill>
+              </a:uFill>
+              <a:latin typeface="Arial"/>
+            </a:endParaRPr>
+          </a:p>
+        </p:txBody>
+      </p:sp>
+      <p:sp>
+        <p:nvSpPr>
+          <p:cNvPr id="132" name="CustomShape 17"/>
+          <p:cNvSpPr/>
+          <p:nvPr/>
+        </p:nvSpPr>
+        <p:spPr>
+          <a:xfrm>
+            <a:off x="2642760" y="2520000"/>
+            <a:ext cx="344520" cy="342720"/>
+          </a:xfrm>
+          <a:prstGeom prst="rect">
+            <a:avLst/>
+          </a:prstGeom>
+          <a:noFill/>
+          <a:ln>
+            <a:noFill/>
+          </a:ln>
+        </p:spPr>
+        <p:style>
+          <a:lnRef idx="0"/>
+          <a:fillRef idx="0"/>
+          <a:effectRef idx="0"/>
+          <a:fontRef idx="minor"/>
+        </p:style>
+        <p:txBody>
+          <a:bodyPr lIns="90000" rIns="90000" tIns="45000" bIns="45000"/>
+          <a:p>
+            <a:r>
+              <a:rPr b="0" lang="fr-FR" sz="1800" spc="-1" strike="noStrike">
+                <a:solidFill>
+                  <a:srgbClr val="000000"/>
+                </a:solidFill>
+                <a:uFill>
+                  <a:solidFill>
+                    <a:srgbClr val="ffffff"/>
+                  </a:solidFill>
+                </a:uFill>
+                <a:latin typeface="Arial"/>
+                <a:ea typeface="DejaVu Sans"/>
+              </a:rPr>
+              <a:t>G</a:t>
             </a:r>
             <a:endParaRPr b="0" lang="fr-FR" sz="1800" spc="-1" strike="noStrike">
               <a:solidFill>
@@ -7630,14 +7299,14 @@
       </p:grpSpPr>
       <p:sp>
         <p:nvSpPr>
-          <p:cNvPr id="121" name="CustomShape 1"/>
+          <p:cNvPr id="133" name="CustomShape 1"/>
           <p:cNvSpPr/>
           <p:nvPr/>
         </p:nvSpPr>
         <p:spPr>
           <a:xfrm rot="18910800">
-            <a:off x="3742920" y="2697840"/>
-            <a:ext cx="359640" cy="359640"/>
+            <a:off x="6658560" y="2337840"/>
+            <a:ext cx="359280" cy="359280"/>
           </a:xfrm>
           <a:prstGeom prst="ellipse">
             <a:avLst/>
@@ -7660,14 +7329,14 @@
       </p:sp>
       <p:sp>
         <p:nvSpPr>
-          <p:cNvPr id="122" name="CustomShape 2"/>
+          <p:cNvPr id="134" name="CustomShape 2"/>
           <p:cNvSpPr/>
           <p:nvPr/>
         </p:nvSpPr>
         <p:spPr>
           <a:xfrm rot="18910800">
-            <a:off x="2466720" y="3966480"/>
-            <a:ext cx="359640" cy="359640"/>
+            <a:off x="6642360" y="906480"/>
+            <a:ext cx="359280" cy="359280"/>
           </a:xfrm>
           <a:prstGeom prst="ellipse">
             <a:avLst/>
@@ -7690,14 +7359,14 @@
       </p:sp>
       <p:sp>
         <p:nvSpPr>
-          <p:cNvPr id="123" name="CustomShape 3"/>
+          <p:cNvPr id="135" name="CustomShape 3"/>
           <p:cNvSpPr/>
           <p:nvPr/>
         </p:nvSpPr>
         <p:spPr>
           <a:xfrm rot="18910800">
-            <a:off x="2473560" y="1420920"/>
-            <a:ext cx="359640" cy="359640"/>
+            <a:off x="4138200" y="898200"/>
+            <a:ext cx="359280" cy="359280"/>
           </a:xfrm>
           <a:prstGeom prst="ellipse">
             <a:avLst/>
@@ -7720,14 +7389,14 @@
       </p:sp>
       <p:sp>
         <p:nvSpPr>
-          <p:cNvPr id="124" name="CustomShape 4"/>
+          <p:cNvPr id="136" name="CustomShape 4"/>
           <p:cNvSpPr/>
           <p:nvPr/>
         </p:nvSpPr>
         <p:spPr>
           <a:xfrm rot="18910800">
-            <a:off x="1196280" y="2689920"/>
-            <a:ext cx="359640" cy="359640"/>
+            <a:off x="4106160" y="2338200"/>
+            <a:ext cx="359280" cy="359280"/>
           </a:xfrm>
           <a:prstGeom prst="ellipse">
             <a:avLst/>
@@ -7750,14 +7419,14 @@
       </p:sp>
       <p:sp>
         <p:nvSpPr>
-          <p:cNvPr id="125" name="Line 5"/>
+          <p:cNvPr id="137" name="Line 5"/>
           <p:cNvSpPr/>
           <p:nvPr/>
         </p:nvSpPr>
         <p:spPr>
-          <a:xfrm>
-            <a:off x="1376640" y="2869920"/>
-            <a:ext cx="2545920" cy="7920"/>
+          <a:xfrm flipV="1">
+            <a:off x="4320000" y="1080000"/>
+            <a:ext cx="2520000" cy="1440000"/>
           </a:xfrm>
           <a:prstGeom prst="line">
             <a:avLst/>
@@ -7777,22 +7446,21 @@
       </p:sp>
       <p:sp>
         <p:nvSpPr>
-          <p:cNvPr id="126" name="Line 6"/>
+          <p:cNvPr id="138" name="CustomShape 6"/>
           <p:cNvSpPr/>
           <p:nvPr/>
         </p:nvSpPr>
         <p:spPr>
-          <a:xfrm flipV="1">
-            <a:off x="2645280" y="1601280"/>
-            <a:ext cx="8280" cy="2545560"/>
-          </a:xfrm>
-          <a:prstGeom prst="line">
-            <a:avLst/>
-          </a:prstGeom>
+          <a:xfrm>
+            <a:off x="3735000" y="2520000"/>
+            <a:ext cx="332280" cy="342720"/>
+          </a:xfrm>
+          <a:prstGeom prst="rect">
+            <a:avLst/>
+          </a:prstGeom>
+          <a:noFill/>
           <a:ln>
-            <a:solidFill>
-              <a:srgbClr val="000000"/>
-            </a:solidFill>
+            <a:noFill/>
           </a:ln>
         </p:spPr>
         <p:style>
@@ -7801,17 +7469,48 @@
           <a:effectRef idx="0"/>
           <a:fontRef idx="minor"/>
         </p:style>
-      </p:sp>
-      <p:sp>
-        <p:nvSpPr>
-          <p:cNvPr id="127" name="CustomShape 7"/>
+        <p:txBody>
+          <a:bodyPr lIns="90000" rIns="90000" tIns="45000" bIns="45000"/>
+          <a:p>
+            <a:r>
+              <a:rPr b="0" lang="fr-FR" sz="1800" spc="-1" strike="noStrike">
+                <a:solidFill>
+                  <a:srgbClr val="000000"/>
+                </a:solidFill>
+                <a:uFill>
+                  <a:solidFill>
+                    <a:srgbClr val="ffffff"/>
+                  </a:solidFill>
+                </a:uFill>
+                <a:latin typeface="Arial"/>
+                <a:ea typeface="DejaVu Sans"/>
+              </a:rPr>
+              <a:t>A</a:t>
+            </a:r>
+            <a:endParaRPr b="0" lang="fr-FR" sz="1800" spc="-1" strike="noStrike">
+              <a:solidFill>
+                <a:srgbClr val="000000"/>
+              </a:solidFill>
+              <a:uFill>
+                <a:solidFill>
+                  <a:srgbClr val="ffffff"/>
+                </a:solidFill>
+              </a:uFill>
+              <a:latin typeface="Arial"/>
+            </a:endParaRPr>
+          </a:p>
+        </p:txBody>
+      </p:sp>
+      <p:sp>
+        <p:nvSpPr>
+          <p:cNvPr id="139" name="CustomShape 7"/>
           <p:cNvSpPr/>
           <p:nvPr/>
         </p:nvSpPr>
         <p:spPr>
           <a:xfrm>
-            <a:off x="891000" y="3024000"/>
-            <a:ext cx="332640" cy="343080"/>
+            <a:off x="6264000" y="2520000"/>
+            <a:ext cx="332280" cy="342720"/>
           </a:xfrm>
           <a:prstGeom prst="rect">
             <a:avLst/>
@@ -7841,8 +7540,9 @@
                   </a:solidFill>
                 </a:uFill>
                 <a:latin typeface="Arial"/>
+                <a:ea typeface="DejaVu Sans"/>
               </a:rPr>
-              <a:t>A</a:t>
+              <a:t>B</a:t>
             </a:r>
             <a:endParaRPr b="0" lang="fr-FR" sz="1800" spc="-1" strike="noStrike">
               <a:solidFill>
@@ -7860,14 +7560,14 @@
       </p:sp>
       <p:sp>
         <p:nvSpPr>
-          <p:cNvPr id="128" name="CustomShape 8"/>
+          <p:cNvPr id="140" name="CustomShape 8"/>
           <p:cNvSpPr/>
           <p:nvPr/>
         </p:nvSpPr>
         <p:spPr>
           <a:xfrm>
-            <a:off x="2115000" y="4248000"/>
-            <a:ext cx="332640" cy="343080"/>
+            <a:off x="6279480" y="665280"/>
+            <a:ext cx="344520" cy="342720"/>
           </a:xfrm>
           <a:prstGeom prst="rect">
             <a:avLst/>
@@ -7897,8 +7597,9 @@
                   </a:solidFill>
                 </a:uFill>
                 <a:latin typeface="Arial"/>
+                <a:ea typeface="DejaVu Sans"/>
               </a:rPr>
-              <a:t>B</a:t>
+              <a:t>C</a:t>
             </a:r>
             <a:endParaRPr b="0" lang="fr-FR" sz="1800" spc="-1" strike="noStrike">
               <a:solidFill>
@@ -7916,14 +7617,14 @@
       </p:sp>
       <p:sp>
         <p:nvSpPr>
-          <p:cNvPr id="129" name="CustomShape 9"/>
+          <p:cNvPr id="141" name="CustomShape 9"/>
           <p:cNvSpPr/>
           <p:nvPr/>
         </p:nvSpPr>
         <p:spPr>
           <a:xfrm>
-            <a:off x="3398760" y="3024000"/>
-            <a:ext cx="344880" cy="343080"/>
+            <a:off x="3759480" y="665280"/>
+            <a:ext cx="344520" cy="342720"/>
           </a:xfrm>
           <a:prstGeom prst="rect">
             <a:avLst/>
@@ -7953,8 +7654,9 @@
                   </a:solidFill>
                 </a:uFill>
                 <a:latin typeface="Arial"/>
+                <a:ea typeface="DejaVu Sans"/>
               </a:rPr>
-              <a:t>C</a:t>
+              <a:t>D</a:t>
             </a:r>
             <a:endParaRPr b="0" lang="fr-FR" sz="1800" spc="-1" strike="noStrike">
               <a:solidFill>
@@ -7972,14 +7674,14 @@
       </p:sp>
       <p:sp>
         <p:nvSpPr>
-          <p:cNvPr id="130" name="CustomShape 10"/>
+          <p:cNvPr id="142" name="CustomShape 10"/>
           <p:cNvSpPr/>
           <p:nvPr/>
         </p:nvSpPr>
         <p:spPr>
           <a:xfrm>
-            <a:off x="2822760" y="1152000"/>
-            <a:ext cx="344880" cy="343080"/>
+            <a:off x="5544000" y="1997280"/>
+            <a:ext cx="576000" cy="342720"/>
           </a:xfrm>
           <a:prstGeom prst="rect">
             <a:avLst/>
@@ -8009,8 +7711,39 @@
                   </a:solidFill>
                 </a:uFill>
                 <a:latin typeface="Arial"/>
+                <a:ea typeface="DejaVu Sans"/>
               </a:rPr>
-              <a:t>D</a:t>
+              <a:t>R</a:t>
+            </a:r>
+            <a:r>
+              <a:rPr b="0" lang="fr-FR" sz="1800" spc="-1" strike="noStrike">
+                <a:solidFill>
+                  <a:srgbClr val="000000"/>
+                </a:solidFill>
+                <a:uFill>
+                  <a:solidFill>
+                    <a:srgbClr val="ffffff"/>
+                  </a:solidFill>
+                </a:uFill>
+                <a:latin typeface="Arial"/>
+                <a:ea typeface="DejaVu Sans"/>
+              </a:rPr>
+              <a:t>’</a:t>
+            </a:r>
+            <a:r>
+              <a:rPr b="0" lang="fr-FR" sz="1800" spc="-1" strike="noStrike" baseline="-33000">
+                <a:solidFill>
+                  <a:srgbClr val="000000"/>
+                </a:solidFill>
+                <a:uFill>
+                  <a:solidFill>
+                    <a:srgbClr val="ffffff"/>
+                  </a:solidFill>
+                </a:uFill>
+                <a:latin typeface="Arial"/>
+                <a:ea typeface="DejaVu Sans"/>
+              </a:rPr>
+              <a:t>R</a:t>
             </a:r>
             <a:endParaRPr b="0" lang="fr-FR" sz="1800" spc="-1" strike="noStrike">
               <a:solidFill>
@@ -8028,21 +7761,23 @@
       </p:sp>
       <p:sp>
         <p:nvSpPr>
-          <p:cNvPr id="131" name="CustomShape 11"/>
+          <p:cNvPr id="143" name="Line 11"/>
           <p:cNvSpPr/>
           <p:nvPr/>
         </p:nvSpPr>
         <p:spPr>
-          <a:xfrm>
-            <a:off x="1932120" y="2557800"/>
-            <a:ext cx="344880" cy="343080"/>
-          </a:xfrm>
-          <a:prstGeom prst="rect">
-            <a:avLst/>
-          </a:prstGeom>
-          <a:noFill/>
+          <a:xfrm flipV="1">
+            <a:off x="7664400" y="2539440"/>
+            <a:ext cx="360" cy="900000"/>
+          </a:xfrm>
+          <a:prstGeom prst="line">
+            <a:avLst/>
+          </a:prstGeom>
           <a:ln>
-            <a:noFill/>
+            <a:solidFill>
+              <a:srgbClr val="000000"/>
+            </a:solidFill>
+            <a:tailEnd len="med" type="triangle" w="med"/>
           </a:ln>
         </p:spPr>
         <p:style>
@@ -8051,47 +7786,17 @@
           <a:effectRef idx="0"/>
           <a:fontRef idx="minor"/>
         </p:style>
-        <p:txBody>
-          <a:bodyPr lIns="90000" rIns="90000" tIns="45000" bIns="45000"/>
-          <a:p>
-            <a:r>
-              <a:rPr b="0" lang="fr-FR" sz="1800" spc="-1" strike="noStrike">
-                <a:solidFill>
-                  <a:srgbClr val="000000"/>
-                </a:solidFill>
-                <a:uFill>
-                  <a:solidFill>
-                    <a:srgbClr val="ffffff"/>
-                  </a:solidFill>
-                </a:uFill>
-                <a:latin typeface="Arial"/>
-              </a:rPr>
-              <a:t>R</a:t>
-            </a:r>
-            <a:endParaRPr b="0" lang="fr-FR" sz="1800" spc="-1" strike="noStrike">
-              <a:solidFill>
-                <a:srgbClr val="000000"/>
-              </a:solidFill>
-              <a:uFill>
-                <a:solidFill>
-                  <a:srgbClr val="ffffff"/>
-                </a:solidFill>
-              </a:uFill>
-              <a:latin typeface="Arial"/>
-            </a:endParaRPr>
-          </a:p>
-        </p:txBody>
-      </p:sp>
-      <p:sp>
-        <p:nvSpPr>
-          <p:cNvPr id="132" name="Line 12"/>
+      </p:sp>
+      <p:sp>
+        <p:nvSpPr>
+          <p:cNvPr id="144" name="Line 12"/>
           <p:cNvSpPr/>
           <p:nvPr/>
         </p:nvSpPr>
         <p:spPr>
-          <a:xfrm flipV="1">
-            <a:off x="4176000" y="3636000"/>
-            <a:ext cx="0" cy="900000"/>
+          <a:xfrm flipH="1">
+            <a:off x="6764400" y="3439440"/>
+            <a:ext cx="900000" cy="360"/>
           </a:xfrm>
           <a:prstGeom prst="line">
             <a:avLst/>
@@ -8112,23 +7817,21 @@
       </p:sp>
       <p:sp>
         <p:nvSpPr>
-          <p:cNvPr id="133" name="Line 13"/>
+          <p:cNvPr id="145" name="CustomShape 13"/>
           <p:cNvSpPr/>
           <p:nvPr/>
         </p:nvSpPr>
         <p:spPr>
-          <a:xfrm flipH="1">
-            <a:off x="3276000" y="4536000"/>
-            <a:ext cx="900000" cy="0"/>
-          </a:xfrm>
-          <a:prstGeom prst="line">
-            <a:avLst/>
-          </a:prstGeom>
+          <a:xfrm>
+            <a:off x="6584400" y="3403440"/>
+            <a:ext cx="431640" cy="343080"/>
+          </a:xfrm>
+          <a:prstGeom prst="rect">
+            <a:avLst/>
+          </a:prstGeom>
+          <a:noFill/>
           <a:ln>
-            <a:solidFill>
-              <a:srgbClr val="000000"/>
-            </a:solidFill>
-            <a:tailEnd len="med" type="triangle" w="med"/>
+            <a:noFill/>
           </a:ln>
         </p:spPr>
         <p:style>
@@ -8137,26 +7840,6 @@
           <a:effectRef idx="0"/>
           <a:fontRef idx="minor"/>
         </p:style>
-      </p:sp>
-      <p:sp>
-        <p:nvSpPr>
-          <p:cNvPr id="134" name="TextShape 14"/>
-          <p:cNvSpPr txBox="1"/>
-          <p:nvPr/>
-        </p:nvSpPr>
-        <p:spPr>
-          <a:xfrm>
-            <a:off x="3096000" y="4500000"/>
-            <a:ext cx="432000" cy="343440"/>
-          </a:xfrm>
-          <a:prstGeom prst="rect">
-            <a:avLst/>
-          </a:prstGeom>
-          <a:noFill/>
-          <a:ln>
-            <a:noFill/>
-          </a:ln>
-        </p:spPr>
         <p:txBody>
           <a:bodyPr lIns="90000" rIns="90000" tIns="45000" bIns="45000"/>
           <a:p>
@@ -8190,14 +7873,14 @@
       </p:sp>
       <p:sp>
         <p:nvSpPr>
-          <p:cNvPr id="135" name="TextShape 15"/>
-          <p:cNvSpPr txBox="1"/>
+          <p:cNvPr id="146" name="CustomShape 14"/>
+          <p:cNvSpPr/>
           <p:nvPr/>
         </p:nvSpPr>
         <p:spPr>
           <a:xfrm>
-            <a:off x="3852000" y="3544560"/>
-            <a:ext cx="432000" cy="343440"/>
+            <a:off x="7340400" y="2448000"/>
+            <a:ext cx="431640" cy="343080"/>
           </a:xfrm>
           <a:prstGeom prst="rect">
             <a:avLst/>
@@ -8207,6 +7890,12 @@
             <a:noFill/>
           </a:ln>
         </p:spPr>
+        <p:style>
+          <a:lnRef idx="0"/>
+          <a:fillRef idx="0"/>
+          <a:effectRef idx="0"/>
+          <a:fontRef idx="minor"/>
+        </p:style>
         <p:txBody>
           <a:bodyPr lIns="90000" rIns="90000" tIns="45000" bIns="45000"/>
           <a:p>
@@ -8223,6 +7912,220 @@
                 <a:latin typeface="Arial"/>
               </a:rPr>
               <a:t>y</a:t>
+            </a:r>
+            <a:endParaRPr b="0" lang="fr-FR" sz="1800" spc="-1" strike="noStrike">
+              <a:solidFill>
+                <a:srgbClr val="000000"/>
+              </a:solidFill>
+              <a:uFill>
+                <a:solidFill>
+                  <a:srgbClr val="ffffff"/>
+                </a:solidFill>
+              </a:uFill>
+              <a:latin typeface="Arial"/>
+            </a:endParaRPr>
+          </a:p>
+        </p:txBody>
+      </p:sp>
+      <p:sp>
+        <p:nvSpPr>
+          <p:cNvPr id="147" name="CustomShape 15"/>
+          <p:cNvSpPr/>
+          <p:nvPr/>
+        </p:nvSpPr>
+        <p:spPr>
+          <a:xfrm>
+            <a:off x="4447080" y="1410120"/>
+            <a:ext cx="515880" cy="342720"/>
+          </a:xfrm>
+          <a:prstGeom prst="rect">
+            <a:avLst/>
+          </a:prstGeom>
+          <a:noFill/>
+          <a:ln>
+            <a:noFill/>
+          </a:ln>
+        </p:spPr>
+        <p:style>
+          <a:lnRef idx="0"/>
+          <a:fillRef idx="0"/>
+          <a:effectRef idx="0"/>
+          <a:fontRef idx="minor"/>
+        </p:style>
+        <p:txBody>
+          <a:bodyPr lIns="90000" rIns="90000" tIns="45000" bIns="45000"/>
+          <a:p>
+            <a:r>
+              <a:rPr b="0" lang="fr-FR" sz="1800" spc="-1" strike="noStrike">
+                <a:solidFill>
+                  <a:srgbClr val="000000"/>
+                </a:solidFill>
+                <a:uFill>
+                  <a:solidFill>
+                    <a:srgbClr val="ffffff"/>
+                  </a:solidFill>
+                </a:uFill>
+                <a:latin typeface="Arial"/>
+                <a:ea typeface="DejaVu Sans"/>
+              </a:rPr>
+              <a:t>R’</a:t>
+            </a:r>
+            <a:r>
+              <a:rPr b="0" lang="fr-FR" sz="1800" spc="-1" strike="noStrike" baseline="-33000">
+                <a:solidFill>
+                  <a:srgbClr val="000000"/>
+                </a:solidFill>
+                <a:uFill>
+                  <a:solidFill>
+                    <a:srgbClr val="ffffff"/>
+                  </a:solidFill>
+                </a:uFill>
+                <a:latin typeface="Arial"/>
+                <a:ea typeface="DejaVu Sans"/>
+              </a:rPr>
+              <a:t>P</a:t>
+            </a:r>
+            <a:endParaRPr b="0" lang="fr-FR" sz="1800" spc="-1" strike="noStrike">
+              <a:solidFill>
+                <a:srgbClr val="000000"/>
+              </a:solidFill>
+              <a:uFill>
+                <a:solidFill>
+                  <a:srgbClr val="ffffff"/>
+                </a:solidFill>
+              </a:uFill>
+              <a:latin typeface="Arial"/>
+            </a:endParaRPr>
+          </a:p>
+        </p:txBody>
+      </p:sp>
+      <p:sp>
+        <p:nvSpPr>
+          <p:cNvPr id="148" name="Line 16"/>
+          <p:cNvSpPr/>
+          <p:nvPr/>
+        </p:nvSpPr>
+        <p:spPr>
+          <a:xfrm>
+            <a:off x="4320000" y="1080000"/>
+            <a:ext cx="2520000" cy="1440000"/>
+          </a:xfrm>
+          <a:prstGeom prst="line">
+            <a:avLst/>
+          </a:prstGeom>
+          <a:ln>
+            <a:solidFill>
+              <a:srgbClr val="000000"/>
+            </a:solidFill>
+          </a:ln>
+        </p:spPr>
+        <p:style>
+          <a:lnRef idx="0"/>
+          <a:fillRef idx="0"/>
+          <a:effectRef idx="0"/>
+          <a:fontRef idx="minor"/>
+        </p:style>
+      </p:sp>
+      <p:sp>
+        <p:nvSpPr>
+          <p:cNvPr id="149" name="Line 17"/>
+          <p:cNvSpPr/>
+          <p:nvPr/>
+        </p:nvSpPr>
+        <p:spPr>
+          <a:xfrm flipH="1">
+            <a:off x="4392000" y="1800000"/>
+            <a:ext cx="1224000" cy="0"/>
+          </a:xfrm>
+          <a:prstGeom prst="line">
+            <a:avLst/>
+          </a:prstGeom>
+          <a:ln>
+            <a:solidFill>
+              <a:srgbClr val="000000"/>
+            </a:solidFill>
+            <a:headEnd len="med" type="triangle" w="med"/>
+            <a:tailEnd len="med" type="triangle" w="med"/>
+          </a:ln>
+        </p:spPr>
+        <p:style>
+          <a:lnRef idx="0"/>
+          <a:fillRef idx="0"/>
+          <a:effectRef idx="0"/>
+          <a:fontRef idx="minor"/>
+        </p:style>
+      </p:sp>
+      <p:sp>
+        <p:nvSpPr>
+          <p:cNvPr id="150" name="Line 18"/>
+          <p:cNvSpPr/>
+          <p:nvPr/>
+        </p:nvSpPr>
+        <p:spPr>
+          <a:xfrm>
+            <a:off x="5560560" y="1800000"/>
+            <a:ext cx="0" cy="720000"/>
+          </a:xfrm>
+          <a:prstGeom prst="line">
+            <a:avLst/>
+          </a:prstGeom>
+          <a:ln>
+            <a:solidFill>
+              <a:srgbClr val="000000"/>
+            </a:solidFill>
+            <a:headEnd len="med" type="triangle" w="med"/>
+            <a:tailEnd len="med" type="triangle" w="med"/>
+          </a:ln>
+        </p:spPr>
+        <p:style>
+          <a:lnRef idx="0"/>
+          <a:fillRef idx="0"/>
+          <a:effectRef idx="0"/>
+          <a:fontRef idx="minor"/>
+        </p:style>
+      </p:sp>
+      <p:sp>
+        <p:nvSpPr>
+          <p:cNvPr id="151" name="CustomShape 19"/>
+          <p:cNvSpPr/>
+          <p:nvPr/>
+        </p:nvSpPr>
+        <p:spPr>
+          <a:xfrm>
+            <a:off x="5415480" y="1421280"/>
+            <a:ext cx="344520" cy="342720"/>
+          </a:xfrm>
+          <a:prstGeom prst="rect">
+            <a:avLst/>
+          </a:prstGeom>
+          <a:noFill/>
+          <a:ln>
+            <a:noFill/>
+          </a:ln>
+        </p:spPr>
+        <p:style>
+          <a:lnRef idx="0"/>
+          <a:fillRef idx="0"/>
+          <a:effectRef idx="0"/>
+          <a:fontRef idx="minor"/>
+        </p:style>
+        <p:txBody>
+          <a:bodyPr lIns="90000" rIns="90000" tIns="45000" bIns="45000"/>
+          <a:p>
+            <a:r>
+              <a:rPr b="0" lang="fr-FR" sz="1800" spc="-1" strike="noStrike">
+                <a:solidFill>
+                  <a:srgbClr val="000000"/>
+                </a:solidFill>
+                <a:uFill>
+                  <a:solidFill>
+                    <a:srgbClr val="ffffff"/>
+                  </a:solidFill>
+                </a:uFill>
+                <a:latin typeface="Arial"/>
+                <a:ea typeface="DejaVu Sans"/>
+              </a:rPr>
+              <a:t>G</a:t>
             </a:r>
             <a:endParaRPr b="0" lang="fr-FR" sz="1800" spc="-1" strike="noStrike">
               <a:solidFill>
@@ -8289,14 +8192,14 @@
       </p:grpSpPr>
       <p:sp>
         <p:nvSpPr>
-          <p:cNvPr id="136" name="CustomShape 1"/>
+          <p:cNvPr id="152" name="CustomShape 1"/>
           <p:cNvSpPr/>
           <p:nvPr/>
         </p:nvSpPr>
         <p:spPr>
           <a:xfrm rot="18910800">
-            <a:off x="3742920" y="2697840"/>
-            <a:ext cx="359640" cy="359640"/>
+            <a:off x="3742560" y="2697840"/>
+            <a:ext cx="359280" cy="359280"/>
           </a:xfrm>
           <a:prstGeom prst="ellipse">
             <a:avLst/>
@@ -8319,14 +8222,14 @@
       </p:sp>
       <p:sp>
         <p:nvSpPr>
-          <p:cNvPr id="137" name="CustomShape 2"/>
+          <p:cNvPr id="153" name="CustomShape 2"/>
           <p:cNvSpPr/>
           <p:nvPr/>
         </p:nvSpPr>
         <p:spPr>
           <a:xfrm rot="18910800">
-            <a:off x="1566720" y="3606480"/>
-            <a:ext cx="359640" cy="359640"/>
+            <a:off x="1566360" y="3606480"/>
+            <a:ext cx="359280" cy="359280"/>
           </a:xfrm>
           <a:prstGeom prst="ellipse">
             <a:avLst/>
@@ -8349,14 +8252,14 @@
       </p:sp>
       <p:sp>
         <p:nvSpPr>
-          <p:cNvPr id="138" name="CustomShape 3"/>
+          <p:cNvPr id="154" name="CustomShape 3"/>
           <p:cNvSpPr/>
           <p:nvPr/>
         </p:nvSpPr>
         <p:spPr>
           <a:xfrm rot="18910800">
-            <a:off x="1592280" y="1825920"/>
-            <a:ext cx="359640" cy="359640"/>
+            <a:off x="1591920" y="1825920"/>
+            <a:ext cx="359280" cy="359280"/>
           </a:xfrm>
           <a:prstGeom prst="ellipse">
             <a:avLst/>
@@ -8379,7 +8282,7 @@
       </p:sp>
       <p:sp>
         <p:nvSpPr>
-          <p:cNvPr id="139" name="Line 4"/>
+          <p:cNvPr id="155" name="Line 4"/>
           <p:cNvSpPr/>
           <p:nvPr/>
         </p:nvSpPr>
@@ -8406,14 +8309,14 @@
       </p:sp>
       <p:sp>
         <p:nvSpPr>
-          <p:cNvPr id="140" name="CustomShape 5"/>
+          <p:cNvPr id="156" name="CustomShape 5"/>
           <p:cNvSpPr/>
           <p:nvPr/>
         </p:nvSpPr>
         <p:spPr>
           <a:xfrm>
             <a:off x="1287000" y="3816000"/>
-            <a:ext cx="332640" cy="343080"/>
+            <a:ext cx="332280" cy="342720"/>
           </a:xfrm>
           <a:prstGeom prst="rect">
             <a:avLst/>
@@ -8443,6 +8346,7 @@
                   </a:solidFill>
                 </a:uFill>
                 <a:latin typeface="Arial"/>
+                <a:ea typeface="DejaVu Sans"/>
               </a:rPr>
               <a:t>A</a:t>
             </a:r>
@@ -8462,14 +8366,14 @@
       </p:sp>
       <p:sp>
         <p:nvSpPr>
-          <p:cNvPr id="141" name="CustomShape 6"/>
+          <p:cNvPr id="157" name="CustomShape 6"/>
           <p:cNvSpPr/>
           <p:nvPr/>
         </p:nvSpPr>
         <p:spPr>
           <a:xfrm>
             <a:off x="4059000" y="2952000"/>
-            <a:ext cx="332640" cy="343080"/>
+            <a:ext cx="332280" cy="342720"/>
           </a:xfrm>
           <a:prstGeom prst="rect">
             <a:avLst/>
@@ -8499,6 +8403,7 @@
                   </a:solidFill>
                 </a:uFill>
                 <a:latin typeface="Arial"/>
+                <a:ea typeface="DejaVu Sans"/>
               </a:rPr>
               <a:t>B</a:t>
             </a:r>
@@ -8518,14 +8423,14 @@
       </p:sp>
       <p:sp>
         <p:nvSpPr>
-          <p:cNvPr id="142" name="CustomShape 7"/>
+          <p:cNvPr id="158" name="CustomShape 7"/>
           <p:cNvSpPr/>
           <p:nvPr/>
         </p:nvSpPr>
         <p:spPr>
           <a:xfrm>
             <a:off x="1310760" y="1512000"/>
-            <a:ext cx="344880" cy="343080"/>
+            <a:ext cx="344520" cy="342720"/>
           </a:xfrm>
           <a:prstGeom prst="rect">
             <a:avLst/>
@@ -8555,6 +8460,7 @@
                   </a:solidFill>
                 </a:uFill>
                 <a:latin typeface="Arial"/>
+                <a:ea typeface="DejaVu Sans"/>
               </a:rPr>
               <a:t>C</a:t>
             </a:r>
@@ -8574,14 +8480,14 @@
       </p:sp>
       <p:sp>
         <p:nvSpPr>
-          <p:cNvPr id="143" name="CustomShape 8"/>
+          <p:cNvPr id="159" name="CustomShape 8"/>
           <p:cNvSpPr/>
           <p:nvPr/>
         </p:nvSpPr>
         <p:spPr>
           <a:xfrm>
             <a:off x="2196000" y="3240000"/>
-            <a:ext cx="504000" cy="343080"/>
+            <a:ext cx="503640" cy="342720"/>
           </a:xfrm>
           <a:prstGeom prst="rect">
             <a:avLst/>
@@ -8611,6 +8517,7 @@
                   </a:solidFill>
                 </a:uFill>
                 <a:latin typeface="Arial"/>
+                <a:ea typeface="DejaVu Sans"/>
               </a:rPr>
               <a:t>R</a:t>
             </a:r>
@@ -8625,6 +8532,7 @@
                   </a:solidFill>
                 </a:uFill>
                 <a:latin typeface="Arial"/>
+                <a:ea typeface="DejaVu Sans"/>
               </a:rPr>
               <a:t>A</a:t>
             </a:r>
@@ -8644,7 +8552,7 @@
       </p:sp>
       <p:sp>
         <p:nvSpPr>
-          <p:cNvPr id="144" name="Line 9"/>
+          <p:cNvPr id="160" name="Line 9"/>
           <p:cNvSpPr/>
           <p:nvPr/>
         </p:nvSpPr>
@@ -8671,7 +8579,7 @@
       </p:sp>
       <p:sp>
         <p:nvSpPr>
-          <p:cNvPr id="145" name="Line 10"/>
+          <p:cNvPr id="161" name="Line 10"/>
           <p:cNvSpPr/>
           <p:nvPr/>
         </p:nvSpPr>
@@ -8698,7 +8606,7 @@
       </p:sp>
       <p:sp>
         <p:nvSpPr>
-          <p:cNvPr id="146" name="Line 11"/>
+          <p:cNvPr id="162" name="Line 11"/>
           <p:cNvSpPr/>
           <p:nvPr/>
         </p:nvSpPr>
@@ -8725,7 +8633,7 @@
       </p:sp>
       <p:sp>
         <p:nvSpPr>
-          <p:cNvPr id="147" name="Line 12"/>
+          <p:cNvPr id="163" name="Line 12"/>
           <p:cNvSpPr/>
           <p:nvPr/>
         </p:nvSpPr>
@@ -8752,14 +8660,14 @@
       </p:sp>
       <p:sp>
         <p:nvSpPr>
-          <p:cNvPr id="148" name="CustomShape 13"/>
+          <p:cNvPr id="164" name="CustomShape 13"/>
           <p:cNvSpPr/>
           <p:nvPr/>
         </p:nvSpPr>
         <p:spPr>
           <a:xfrm>
             <a:off x="1542240" y="2448000"/>
-            <a:ext cx="863640" cy="359640"/>
+            <a:ext cx="863280" cy="359280"/>
           </a:xfrm>
           <a:prstGeom prst="rect">
             <a:avLst/>
@@ -8789,6 +8697,7 @@
                   </a:solidFill>
                 </a:uFill>
                 <a:latin typeface="Arial"/>
+                <a:ea typeface="DejaVu Sans"/>
               </a:rPr>
               <a:t>alpha</a:t>
             </a:r>
@@ -8808,14 +8717,14 @@
       </p:sp>
       <p:sp>
         <p:nvSpPr>
-          <p:cNvPr id="149" name="CustomShape 14"/>
+          <p:cNvPr id="165" name="CustomShape 14"/>
           <p:cNvSpPr/>
           <p:nvPr/>
         </p:nvSpPr>
         <p:spPr>
           <a:xfrm>
             <a:off x="3024000" y="2486880"/>
-            <a:ext cx="504000" cy="343080"/>
+            <a:ext cx="503640" cy="342720"/>
           </a:xfrm>
           <a:prstGeom prst="rect">
             <a:avLst/>
@@ -8845,6 +8754,7 @@
                   </a:solidFill>
                 </a:uFill>
                 <a:latin typeface="Arial"/>
+                <a:ea typeface="DejaVu Sans"/>
               </a:rPr>
               <a:t>R</a:t>
             </a:r>
@@ -8859,6 +8769,7 @@
                   </a:solidFill>
                 </a:uFill>
                 <a:latin typeface="Arial"/>
+                <a:ea typeface="DejaVu Sans"/>
               </a:rPr>
               <a:t>B</a:t>
             </a:r>
@@ -8878,14 +8789,14 @@
       </p:sp>
       <p:sp>
         <p:nvSpPr>
-          <p:cNvPr id="150" name="Line 15"/>
+          <p:cNvPr id="166" name="Line 15"/>
           <p:cNvSpPr/>
           <p:nvPr/>
         </p:nvSpPr>
         <p:spPr>
           <a:xfrm flipV="1">
             <a:off x="3744000" y="3492000"/>
-            <a:ext cx="0" cy="900000"/>
+            <a:ext cx="360" cy="900000"/>
           </a:xfrm>
           <a:prstGeom prst="line">
             <a:avLst/>
@@ -8906,14 +8817,14 @@
       </p:sp>
       <p:sp>
         <p:nvSpPr>
-          <p:cNvPr id="151" name="Line 16"/>
+          <p:cNvPr id="167" name="Line 16"/>
           <p:cNvSpPr/>
           <p:nvPr/>
         </p:nvSpPr>
         <p:spPr>
           <a:xfrm flipH="1">
             <a:off x="2844000" y="4392000"/>
-            <a:ext cx="900000" cy="0"/>
+            <a:ext cx="900000" cy="360"/>
           </a:xfrm>
           <a:prstGeom prst="line">
             <a:avLst/>
@@ -8934,14 +8845,14 @@
       </p:sp>
       <p:sp>
         <p:nvSpPr>
-          <p:cNvPr id="152" name="TextShape 17"/>
-          <p:cNvSpPr txBox="1"/>
+          <p:cNvPr id="168" name="CustomShape 17"/>
+          <p:cNvSpPr/>
           <p:nvPr/>
         </p:nvSpPr>
         <p:spPr>
           <a:xfrm>
             <a:off x="2628000" y="4392000"/>
-            <a:ext cx="432000" cy="343440"/>
+            <a:ext cx="431640" cy="343080"/>
           </a:xfrm>
           <a:prstGeom prst="rect">
             <a:avLst/>
@@ -8951,6 +8862,12 @@
             <a:noFill/>
           </a:ln>
         </p:spPr>
+        <p:style>
+          <a:lnRef idx="0"/>
+          <a:fillRef idx="0"/>
+          <a:effectRef idx="0"/>
+          <a:fontRef idx="minor"/>
+        </p:style>
         <p:txBody>
           <a:bodyPr lIns="90000" rIns="90000" tIns="45000" bIns="45000"/>
           <a:p>
@@ -8984,14 +8901,14 @@
       </p:sp>
       <p:sp>
         <p:nvSpPr>
-          <p:cNvPr id="153" name="TextShape 18"/>
-          <p:cNvSpPr txBox="1"/>
+          <p:cNvPr id="169" name="CustomShape 18"/>
+          <p:cNvSpPr/>
           <p:nvPr/>
         </p:nvSpPr>
         <p:spPr>
           <a:xfrm>
             <a:off x="3420000" y="3400560"/>
-            <a:ext cx="432000" cy="343440"/>
+            <a:ext cx="431640" cy="343080"/>
           </a:xfrm>
           <a:prstGeom prst="rect">
             <a:avLst/>
@@ -9001,6 +8918,12 @@
             <a:noFill/>
           </a:ln>
         </p:spPr>
+        <p:style>
+          <a:lnRef idx="0"/>
+          <a:fillRef idx="0"/>
+          <a:effectRef idx="0"/>
+          <a:fontRef idx="minor"/>
+        </p:style>
         <p:txBody>
           <a:bodyPr lIns="90000" rIns="90000" tIns="45000" bIns="45000"/>
           <a:p>
@@ -9017,6 +8940,63 @@
                 <a:latin typeface="Arial"/>
               </a:rPr>
               <a:t>y</a:t>
+            </a:r>
+            <a:endParaRPr b="0" lang="fr-FR" sz="1800" spc="-1" strike="noStrike">
+              <a:solidFill>
+                <a:srgbClr val="000000"/>
+              </a:solidFill>
+              <a:uFill>
+                <a:solidFill>
+                  <a:srgbClr val="ffffff"/>
+                </a:solidFill>
+              </a:uFill>
+              <a:latin typeface="Arial"/>
+            </a:endParaRPr>
+          </a:p>
+        </p:txBody>
+      </p:sp>
+      <p:sp>
+        <p:nvSpPr>
+          <p:cNvPr id="170" name="CustomShape 19"/>
+          <p:cNvSpPr/>
+          <p:nvPr/>
+        </p:nvSpPr>
+        <p:spPr>
+          <a:xfrm>
+            <a:off x="2534760" y="2520000"/>
+            <a:ext cx="344520" cy="342720"/>
+          </a:xfrm>
+          <a:prstGeom prst="rect">
+            <a:avLst/>
+          </a:prstGeom>
+          <a:noFill/>
+          <a:ln>
+            <a:noFill/>
+          </a:ln>
+        </p:spPr>
+        <p:style>
+          <a:lnRef idx="0"/>
+          <a:fillRef idx="0"/>
+          <a:effectRef idx="0"/>
+          <a:fontRef idx="minor"/>
+        </p:style>
+        <p:txBody>
+          <a:bodyPr lIns="90000" rIns="90000" tIns="45000" bIns="45000"/>
+          <a:p>
+            <a:r>
+              <a:rPr b="0" lang="fr-FR" sz="1800" spc="-1" strike="noStrike">
+                <a:solidFill>
+                  <a:srgbClr val="000000"/>
+                </a:solidFill>
+                <a:uFill>
+                  <a:solidFill>
+                    <a:srgbClr val="ffffff"/>
+                  </a:solidFill>
+                </a:uFill>
+                <a:latin typeface="Arial"/>
+                <a:ea typeface="DejaVu Sans"/>
+              </a:rPr>
+              <a:t>G</a:t>
             </a:r>
             <a:endParaRPr b="0" lang="fr-FR" sz="1800" spc="-1" strike="noStrike">
               <a:solidFill>

</xml_diff>